<commit_message>
(no-tn-check) Update version of slides
</commit_message>
<xml_diff>
--- a/slides/ARM_TechCon_2015/AdaCore ARM TechCon 2015.pptx
+++ b/slides/ARM_TechCon_2015/AdaCore ARM TechCon 2015.pptx
@@ -5,10 +5,10 @@
     <p:sldMasterId id="2147483656" r:id="rId1"/>
   </p:sldMasterIdLst>
   <p:notesMasterIdLst>
-    <p:notesMasterId r:id="rId33"/>
+    <p:notesMasterId r:id="rId34"/>
   </p:notesMasterIdLst>
   <p:handoutMasterIdLst>
-    <p:handoutMasterId r:id="rId34"/>
+    <p:handoutMasterId r:id="rId35"/>
   </p:handoutMasterIdLst>
   <p:sldIdLst>
     <p:sldId id="259" r:id="rId2"/>
@@ -41,7 +41,8 @@
     <p:sldId id="279" r:id="rId29"/>
     <p:sldId id="300" r:id="rId30"/>
     <p:sldId id="281" r:id="rId31"/>
-    <p:sldId id="309" r:id="rId32"/>
+    <p:sldId id="335" r:id="rId32"/>
+    <p:sldId id="309" r:id="rId33"/>
   </p:sldIdLst>
   <p:sldSz cx="9144000" cy="5715000" type="screen16x10"/>
   <p:notesSz cx="6858000" cy="9144000"/>
@@ -187,6 +188,7 @@
             <p14:sldId id="279"/>
             <p14:sldId id="300"/>
             <p14:sldId id="281"/>
+            <p14:sldId id="335"/>
           </p14:sldIdLst>
         </p14:section>
         <p14:section name="Conclusion" id="{790CEF5B-569A-4C2F-BED5-750B08C0E5AD}">
@@ -226,6 +228,345 @@
     </p:ext>
   </p:extLst>
 </p:presentation>
+</file>
+
+<file path=ppt/charts/chart1.xml><?xml version="1.0" encoding="utf-8"?>
+<c:chartSpace xmlns:c="http://schemas.openxmlformats.org/drawingml/2006/chart" xmlns:a="http://schemas.openxmlformats.org/drawingml/2006/main" xmlns:r="http://schemas.openxmlformats.org/officeDocument/2006/relationships">
+  <c:date1904 val="0"/>
+  <c:lang val="en-US"/>
+  <c:roundedCorners val="0"/>
+  <mc:AlternateContent xmlns:mc="http://schemas.openxmlformats.org/markup-compatibility/2006">
+    <mc:Choice xmlns:c14="http://schemas.microsoft.com/office/drawing/2007/8/2/chart" Requires="c14">
+      <c14:style val="102"/>
+    </mc:Choice>
+    <mc:Fallback>
+      <c:style val="2"/>
+    </mc:Fallback>
+  </mc:AlternateContent>
+  <c:chart>
+    <c:title>
+      <c:tx>
+        <c:rich>
+          <a:bodyPr/>
+          <a:lstStyle/>
+          <a:p>
+            <a:pPr>
+              <a:defRPr sz="1400" b="1" i="0" u="none" strike="noStrike" baseline="0">
+                <a:solidFill>
+                  <a:srgbClr val="000000"/>
+                </a:solidFill>
+                <a:latin typeface="Arial"/>
+                <a:ea typeface="Arial"/>
+                <a:cs typeface="Arial"/>
+              </a:defRPr>
+            </a:pPr>
+            <a:r>
+              <a:rPr lang="en-US" sz="1400"/>
+              <a:t>Relative Cost To Fix Bugs Over Life Cycle</a:t>
+            </a:r>
+          </a:p>
+        </c:rich>
+      </c:tx>
+      <c:layout>
+        <c:manualLayout>
+          <c:xMode val="edge"/>
+          <c:yMode val="edge"/>
+          <c:x val="0.29443696349550508"/>
+          <c:y val="1.9138811553111177E-2"/>
+        </c:manualLayout>
+      </c:layout>
+      <c:overlay val="0"/>
+      <c:spPr>
+        <a:noFill/>
+        <a:ln w="23254">
+          <a:noFill/>
+        </a:ln>
+      </c:spPr>
+    </c:title>
+    <c:autoTitleDeleted val="0"/>
+    <c:view3D>
+      <c:rotX val="15"/>
+      <c:hPercent val="49"/>
+      <c:rotY val="20"/>
+      <c:depthPercent val="100"/>
+      <c:rAngAx val="1"/>
+    </c:view3D>
+    <c:floor>
+      <c:thickness val="0"/>
+      <c:spPr>
+        <a:solidFill>
+          <a:srgbClr val="C0C0C0"/>
+        </a:solidFill>
+        <a:ln w="3175">
+          <a:solidFill>
+            <a:srgbClr val="000000"/>
+          </a:solidFill>
+          <a:prstDash val="solid"/>
+        </a:ln>
+      </c:spPr>
+    </c:floor>
+    <c:sideWall>
+      <c:thickness val="0"/>
+      <c:spPr>
+        <a:solidFill>
+          <a:srgbClr val="C0C0C0"/>
+        </a:solidFill>
+        <a:ln w="12700">
+          <a:solidFill>
+            <a:srgbClr val="808080"/>
+          </a:solidFill>
+          <a:prstDash val="solid"/>
+        </a:ln>
+      </c:spPr>
+    </c:sideWall>
+    <c:backWall>
+      <c:thickness val="0"/>
+      <c:spPr>
+        <a:solidFill>
+          <a:srgbClr val="C0C0C0"/>
+        </a:solidFill>
+        <a:ln w="12700">
+          <a:solidFill>
+            <a:srgbClr val="808080"/>
+          </a:solidFill>
+          <a:prstDash val="solid"/>
+        </a:ln>
+      </c:spPr>
+    </c:backWall>
+    <c:plotArea>
+      <c:layout>
+        <c:manualLayout>
+          <c:layoutTarget val="inner"/>
+          <c:xMode val="edge"/>
+          <c:yMode val="edge"/>
+          <c:x val="5.2917232021709636E-2"/>
+          <c:y val="0.12918660287081341"/>
+          <c:w val="0.93351424694708274"/>
+          <c:h val="0.73923444976076558"/>
+        </c:manualLayout>
+      </c:layout>
+      <c:bar3DChart>
+        <c:barDir val="col"/>
+        <c:grouping val="clustered"/>
+        <c:varyColors val="0"/>
+        <c:ser>
+          <c:idx val="0"/>
+          <c:order val="0"/>
+          <c:spPr>
+            <a:solidFill>
+              <a:srgbClr val="9999FF"/>
+            </a:solidFill>
+            <a:ln w="11626">
+              <a:solidFill>
+                <a:srgbClr val="000000"/>
+              </a:solidFill>
+              <a:prstDash val="solid"/>
+            </a:ln>
+          </c:spPr>
+          <c:invertIfNegative val="0"/>
+          <c:cat>
+            <c:strRef>
+              <c:f>Sheet1!$A$1:$A$6</c:f>
+              <c:strCache>
+                <c:ptCount val="6"/>
+                <c:pt idx="0">
+                  <c:v>Requirements</c:v>
+                </c:pt>
+                <c:pt idx="1">
+                  <c:v>Design</c:v>
+                </c:pt>
+                <c:pt idx="2">
+                  <c:v>Code</c:v>
+                </c:pt>
+                <c:pt idx="3">
+                  <c:v>Development Test</c:v>
+                </c:pt>
+                <c:pt idx="4">
+                  <c:v>Acceptance Test</c:v>
+                </c:pt>
+                <c:pt idx="5">
+                  <c:v>Operation</c:v>
+                </c:pt>
+              </c:strCache>
+            </c:strRef>
+          </c:cat>
+          <c:val>
+            <c:numRef>
+              <c:f>Sheet1!$B$1:$B$6</c:f>
+              <c:numCache>
+                <c:formatCode>General</c:formatCode>
+                <c:ptCount val="6"/>
+                <c:pt idx="0">
+                  <c:v>1.5</c:v>
+                </c:pt>
+                <c:pt idx="1">
+                  <c:v>4.5</c:v>
+                </c:pt>
+                <c:pt idx="2">
+                  <c:v>10</c:v>
+                </c:pt>
+                <c:pt idx="3">
+                  <c:v>25</c:v>
+                </c:pt>
+                <c:pt idx="4">
+                  <c:v>60</c:v>
+                </c:pt>
+                <c:pt idx="5">
+                  <c:v>170</c:v>
+                </c:pt>
+              </c:numCache>
+            </c:numRef>
+          </c:val>
+        </c:ser>
+        <c:dLbls>
+          <c:showLegendKey val="0"/>
+          <c:showVal val="0"/>
+          <c:showCatName val="0"/>
+          <c:showSerName val="0"/>
+          <c:showPercent val="0"/>
+          <c:showBubbleSize val="0"/>
+        </c:dLbls>
+        <c:gapWidth val="150"/>
+        <c:shape val="box"/>
+        <c:axId val="558186848"/>
+        <c:axId val="558200176"/>
+        <c:axId val="0"/>
+      </c:bar3DChart>
+      <c:catAx>
+        <c:axId val="558186848"/>
+        <c:scaling>
+          <c:orientation val="minMax"/>
+        </c:scaling>
+        <c:delete val="0"/>
+        <c:axPos val="b"/>
+        <c:numFmt formatCode="General" sourceLinked="1"/>
+        <c:majorTickMark val="out"/>
+        <c:minorTickMark val="none"/>
+        <c:tickLblPos val="low"/>
+        <c:spPr>
+          <a:ln w="2907">
+            <a:solidFill>
+              <a:srgbClr val="000000"/>
+            </a:solidFill>
+            <a:prstDash val="solid"/>
+          </a:ln>
+        </c:spPr>
+        <c:txPr>
+          <a:bodyPr rot="0" vert="horz"/>
+          <a:lstStyle/>
+          <a:p>
+            <a:pPr>
+              <a:defRPr sz="891" b="0" i="0" u="none" strike="noStrike" baseline="0">
+                <a:solidFill>
+                  <a:srgbClr val="000000"/>
+                </a:solidFill>
+                <a:latin typeface="Arial"/>
+                <a:ea typeface="Arial"/>
+                <a:cs typeface="Arial"/>
+              </a:defRPr>
+            </a:pPr>
+            <a:endParaRPr lang="en-US"/>
+          </a:p>
+        </c:txPr>
+        <c:crossAx val="558200176"/>
+        <c:crosses val="autoZero"/>
+        <c:auto val="1"/>
+        <c:lblAlgn val="ctr"/>
+        <c:lblOffset val="100"/>
+        <c:tickLblSkip val="1"/>
+        <c:tickMarkSkip val="1"/>
+        <c:noMultiLvlLbl val="0"/>
+      </c:catAx>
+      <c:valAx>
+        <c:axId val="558200176"/>
+        <c:scaling>
+          <c:orientation val="minMax"/>
+        </c:scaling>
+        <c:delete val="0"/>
+        <c:axPos val="l"/>
+        <c:majorGridlines>
+          <c:spPr>
+            <a:ln w="2907">
+              <a:solidFill>
+                <a:srgbClr val="000000"/>
+              </a:solidFill>
+              <a:prstDash val="solid"/>
+            </a:ln>
+          </c:spPr>
+        </c:majorGridlines>
+        <c:numFmt formatCode="General" sourceLinked="1"/>
+        <c:majorTickMark val="out"/>
+        <c:minorTickMark val="none"/>
+        <c:tickLblPos val="nextTo"/>
+        <c:spPr>
+          <a:ln w="2907">
+            <a:solidFill>
+              <a:srgbClr val="000000"/>
+            </a:solidFill>
+            <a:prstDash val="solid"/>
+          </a:ln>
+        </c:spPr>
+        <c:txPr>
+          <a:bodyPr rot="0" vert="horz"/>
+          <a:lstStyle/>
+          <a:p>
+            <a:pPr>
+              <a:defRPr sz="891" b="0" i="0" u="none" strike="noStrike" baseline="0">
+                <a:solidFill>
+                  <a:srgbClr val="000000"/>
+                </a:solidFill>
+                <a:latin typeface="Arial"/>
+                <a:ea typeface="Arial"/>
+                <a:cs typeface="Arial"/>
+              </a:defRPr>
+            </a:pPr>
+            <a:endParaRPr lang="en-US"/>
+          </a:p>
+        </c:txPr>
+        <c:crossAx val="558186848"/>
+        <c:crosses val="autoZero"/>
+        <c:crossBetween val="between"/>
+      </c:valAx>
+      <c:spPr>
+        <a:noFill/>
+        <a:ln w="21145">
+          <a:noFill/>
+        </a:ln>
+      </c:spPr>
+    </c:plotArea>
+    <c:plotVisOnly val="1"/>
+    <c:dispBlanksAs val="gap"/>
+    <c:showDLblsOverMax val="0"/>
+  </c:chart>
+  <c:spPr>
+    <a:solidFill>
+      <a:srgbClr val="FFFFFF"/>
+    </a:solidFill>
+    <a:ln>
+      <a:noFill/>
+    </a:ln>
+  </c:spPr>
+  <c:txPr>
+    <a:bodyPr/>
+    <a:lstStyle/>
+    <a:p>
+      <a:pPr>
+        <a:defRPr sz="891" b="0" i="0" u="none" strike="noStrike" baseline="0">
+          <a:solidFill>
+            <a:srgbClr val="000000"/>
+          </a:solidFill>
+          <a:latin typeface="Arial"/>
+          <a:ea typeface="Arial"/>
+          <a:cs typeface="Arial"/>
+        </a:defRPr>
+      </a:pPr>
+      <a:endParaRPr lang="en-US"/>
+    </a:p>
+  </c:txPr>
+  <c:externalData r:id="rId1">
+    <c:autoUpdate val="0"/>
+  </c:externalData>
+</c:chartSpace>
 </file>
 
 <file path=ppt/handoutMasters/handoutMaster1.xml><?xml version="1.0" encoding="utf-8"?>
@@ -311,7 +652,7 @@
             <a:fld id="{D83FDC75-7F73-4A4A-A77C-09AADF00E0EA}" type="datetimeFigureOut">
               <a:rPr lang="en-US" smtClean="0"/>
               <a:pPr/>
-              <a:t>10/22/2015</a:t>
+              <a:t>10/26/2015</a:t>
             </a:fld>
             <a:endParaRPr lang="en-US" dirty="0"/>
           </a:p>
@@ -478,7 +819,7 @@
             <a:fld id="{48AEF76B-3757-4A0B-AF93-28494465C1DD}" type="datetimeFigureOut">
               <a:rPr lang="en-US" smtClean="0"/>
               <a:pPr/>
-              <a:t>10/22/2015</a:t>
+              <a:t>10/26/2015</a:t>
             </a:fld>
             <a:endParaRPr lang="en-US" dirty="0"/>
           </a:p>
@@ -7774,6 +8115,46 @@
           </a:p>
         </p:txBody>
       </p:sp>
+      <p:pic>
+        <p:nvPicPr>
+          <p:cNvPr id="4" name="Picture 3"/>
+          <p:cNvPicPr>
+            <a:picLocks noChangeAspect="1"/>
+          </p:cNvPicPr>
+          <p:nvPr/>
+        </p:nvPicPr>
+        <p:blipFill>
+          <a:blip r:embed="rId2" cstate="email">
+            <a:extLst>
+              <a:ext uri="{28A0092B-C50C-407E-A947-70E740481C1C}">
+                <a14:useLocalDpi xmlns:a14="http://schemas.microsoft.com/office/drawing/2010/main" val="0"/>
+              </a:ext>
+            </a:extLst>
+          </a:blip>
+          <a:stretch>
+            <a:fillRect/>
+          </a:stretch>
+        </p:blipFill>
+        <p:spPr>
+          <a:xfrm>
+            <a:off x="7772400" y="1333500"/>
+            <a:ext cx="1007918" cy="1790700"/>
+          </a:xfrm>
+          <a:prstGeom prst="rect">
+            <a:avLst/>
+          </a:prstGeom>
+          <a:ln>
+            <a:noFill/>
+          </a:ln>
+          <a:effectLst>
+            <a:outerShdw blurRad="292100" dist="139700" dir="2700000" algn="tl" rotWithShape="0">
+              <a:srgbClr val="333333">
+                <a:alpha val="65000"/>
+              </a:srgbClr>
+            </a:outerShdw>
+          </a:effectLst>
+        </p:spPr>
+      </p:pic>
     </p:spTree>
     <p:extLst>
       <p:ext uri="{BB962C8B-B14F-4D97-AF65-F5344CB8AC3E}">
@@ -8788,71 +9169,169 @@
           </a:p>
         </p:txBody>
       </p:sp>
+      <p:pic>
+        <p:nvPicPr>
+          <p:cNvPr id="1166" name="Picture 142" descr="http://www.coolghouls.com/halloween/Young%20Frankenstein%20001.jpg"/>
+          <p:cNvPicPr>
+            <a:picLocks noChangeAspect="1" noChangeArrowheads="1"/>
+          </p:cNvPicPr>
+          <p:nvPr/>
+        </p:nvPicPr>
+        <p:blipFill>
+          <a:blip r:embed="rId4" cstate="email">
+            <a:extLst>
+              <a:ext uri="{28A0092B-C50C-407E-A947-70E740481C1C}">
+                <a14:useLocalDpi xmlns:a14="http://schemas.microsoft.com/office/drawing/2010/main" val="0"/>
+              </a:ext>
+            </a:extLst>
+          </a:blip>
+          <a:srcRect/>
+          <a:stretch>
+            <a:fillRect/>
+          </a:stretch>
+        </p:blipFill>
+        <p:spPr bwMode="auto">
+          <a:xfrm>
+            <a:off x="7391400" y="113795"/>
+            <a:ext cx="942457" cy="1427331"/>
+          </a:xfrm>
+          <a:prstGeom prst="roundRect">
+            <a:avLst>
+              <a:gd name="adj" fmla="val 8594"/>
+            </a:avLst>
+          </a:prstGeom>
+          <a:solidFill>
+            <a:srgbClr val="FFFFFF">
+              <a:shade val="85000"/>
+            </a:srgbClr>
+          </a:solidFill>
+          <a:ln>
+            <a:noFill/>
+          </a:ln>
+          <a:effectLst>
+            <a:reflection blurRad="12700" stA="38000" endPos="28000" dist="5000" dir="5400000" sy="-100000" algn="bl" rotWithShape="0"/>
+          </a:effectLst>
+          <a:extLst>
+            <a:ext uri="{909E8E84-426E-40DD-AFC4-6F175D3DCCD1}">
+              <a14:hiddenFill xmlns:a14="http://schemas.microsoft.com/office/drawing/2010/main">
+                <a:solidFill>
+                  <a:srgbClr val="FFFFFF"/>
+                </a:solidFill>
+              </a14:hiddenFill>
+            </a:ext>
+          </a:extLst>
+        </p:spPr>
+      </p:pic>
       <p:grpSp>
         <p:nvGrpSpPr>
-          <p:cNvPr id="8" name="Group 7"/>
+          <p:cNvPr id="5" name="Group 4"/>
           <p:cNvGrpSpPr/>
           <p:nvPr/>
         </p:nvGrpSpPr>
         <p:grpSpPr>
           <a:xfrm>
             <a:off x="208050" y="1714500"/>
-            <a:ext cx="3594846" cy="2752726"/>
-            <a:chOff x="381000" y="1714500"/>
-            <a:chExt cx="3594846" cy="2752726"/>
+            <a:ext cx="3594846" cy="3122058"/>
+            <a:chOff x="208050" y="1714500"/>
+            <a:chExt cx="3594846" cy="3122058"/>
           </a:xfrm>
         </p:grpSpPr>
-        <p:pic>
-          <p:nvPicPr>
-            <p:cNvPr id="1028" name="Picture 4" descr="http://www.physics.gatech.edu/system/files/u1080/flavio_fenton_10.28.14_0.jpg"/>
-            <p:cNvPicPr>
-              <a:picLocks noChangeAspect="1" noChangeArrowheads="1"/>
-            </p:cNvPicPr>
+        <p:grpSp>
+          <p:nvGrpSpPr>
+            <p:cNvPr id="8" name="Group 7"/>
+            <p:cNvGrpSpPr/>
             <p:nvPr/>
-          </p:nvPicPr>
-          <p:blipFill>
-            <a:blip r:embed="rId4" cstate="email">
+          </p:nvGrpSpPr>
+          <p:grpSpPr>
+            <a:xfrm>
+              <a:off x="208050" y="1714500"/>
+              <a:ext cx="3594846" cy="2752726"/>
+              <a:chOff x="381000" y="1714500"/>
+              <a:chExt cx="3594846" cy="2752726"/>
+            </a:xfrm>
+          </p:grpSpPr>
+          <p:pic>
+            <p:nvPicPr>
+              <p:cNvPr id="1028" name="Picture 4" descr="http://www.physics.gatech.edu/system/files/u1080/flavio_fenton_10.28.14_0.jpg"/>
+              <p:cNvPicPr>
+                <a:picLocks noChangeAspect="1" noChangeArrowheads="1"/>
+              </p:cNvPicPr>
+              <p:nvPr/>
+            </p:nvPicPr>
+            <p:blipFill>
+              <a:blip r:embed="rId5" cstate="email">
+                <a:extLst>
+                  <a:ext uri="{28A0092B-C50C-407E-A947-70E740481C1C}">
+                    <a14:useLocalDpi xmlns:a14="http://schemas.microsoft.com/office/drawing/2010/main" val="0"/>
+                  </a:ext>
+                </a:extLst>
+              </a:blip>
+              <a:srcRect/>
+              <a:stretch>
+                <a:fillRect/>
+              </a:stretch>
+            </p:blipFill>
+            <p:spPr bwMode="auto">
+              <a:xfrm>
+                <a:off x="381000" y="2476500"/>
+                <a:ext cx="3594846" cy="1990726"/>
+              </a:xfrm>
+              <a:prstGeom prst="rect">
+                <a:avLst/>
+              </a:prstGeom>
+              <a:noFill/>
               <a:extLst>
-                <a:ext uri="{28A0092B-C50C-407E-A947-70E740481C1C}">
-                  <a14:useLocalDpi xmlns:a14="http://schemas.microsoft.com/office/drawing/2010/main" val="0"/>
+                <a:ext uri="{909E8E84-426E-40DD-AFC4-6F175D3DCCD1}">
+                  <a14:hiddenFill xmlns:a14="http://schemas.microsoft.com/office/drawing/2010/main">
+                    <a:solidFill>
+                      <a:srgbClr val="FFFFFF"/>
+                    </a:solidFill>
+                  </a14:hiddenFill>
                 </a:ext>
               </a:extLst>
-            </a:blip>
-            <a:srcRect/>
-            <a:stretch>
-              <a:fillRect/>
-            </a:stretch>
-          </p:blipFill>
-          <p:spPr bwMode="auto">
-            <a:xfrm>
-              <a:off x="381000" y="2476500"/>
-              <a:ext cx="3594846" cy="1990726"/>
-            </a:xfrm>
-            <a:prstGeom prst="rect">
-              <a:avLst/>
-            </a:prstGeom>
-            <a:noFill/>
-            <a:extLst>
-              <a:ext uri="{909E8E84-426E-40DD-AFC4-6F175D3DCCD1}">
-                <a14:hiddenFill xmlns:a14="http://schemas.microsoft.com/office/drawing/2010/main">
-                  <a:solidFill>
-                    <a:srgbClr val="FFFFFF"/>
-                  </a:solidFill>
-                </a14:hiddenFill>
-              </a:ext>
-            </a:extLst>
-          </p:spPr>
-        </p:pic>
+            </p:spPr>
+          </p:pic>
+          <p:sp>
+            <p:nvSpPr>
+              <p:cNvPr id="7" name="TextBox 6"/>
+              <p:cNvSpPr txBox="1"/>
+              <p:nvPr/>
+            </p:nvSpPr>
+            <p:spPr>
+              <a:xfrm>
+                <a:off x="1198315" y="1714500"/>
+                <a:ext cx="1960217" cy="584775"/>
+              </a:xfrm>
+              <a:prstGeom prst="rect">
+                <a:avLst/>
+              </a:prstGeom>
+              <a:noFill/>
+            </p:spPr>
+            <p:txBody>
+              <a:bodyPr wrap="none" rtlCol="0">
+                <a:spAutoFit/>
+              </a:bodyPr>
+              <a:lstStyle/>
+              <a:p>
+                <a:r>
+                  <a:rPr lang="en-US" sz="3200" dirty="0" smtClean="0"/>
+                  <a:t>Too Much</a:t>
+                </a:r>
+                <a:endParaRPr lang="en-US" sz="3200" dirty="0"/>
+              </a:p>
+            </p:txBody>
+          </p:sp>
+        </p:grpSp>
         <p:sp>
           <p:nvSpPr>
-            <p:cNvPr id="7" name="TextBox 6"/>
+            <p:cNvPr id="4" name="TextBox 3"/>
             <p:cNvSpPr txBox="1"/>
             <p:nvPr/>
           </p:nvSpPr>
           <p:spPr>
             <a:xfrm>
-              <a:off x="1198315" y="1714500"/>
-              <a:ext cx="1960217" cy="584775"/>
+              <a:off x="1066722" y="4467226"/>
+              <a:ext cx="1877502" cy="369332"/>
             </a:xfrm>
             <a:prstGeom prst="rect">
               <a:avLst/>
@@ -8866,79 +9345,124 @@
             <a:lstStyle/>
             <a:p>
               <a:r>
-                <a:rPr lang="en-US" sz="3200" dirty="0" smtClean="0"/>
-                <a:t>Too Much</a:t>
+                <a:rPr lang="en-US" i="0" kern="1200" dirty="0" smtClean="0"/>
+                <a:t>Dr. Frankenstein</a:t>
               </a:r>
-              <a:endParaRPr lang="en-US" sz="3200" dirty="0"/>
+              <a:endParaRPr lang="en-US" i="0" kern="1200" dirty="0" smtClean="0"/>
             </a:p>
           </p:txBody>
         </p:sp>
       </p:grpSp>
       <p:grpSp>
         <p:nvGrpSpPr>
-          <p:cNvPr id="9" name="Group 8"/>
+          <p:cNvPr id="6" name="Group 5"/>
           <p:cNvGrpSpPr/>
           <p:nvPr/>
         </p:nvGrpSpPr>
         <p:grpSpPr>
           <a:xfrm>
             <a:off x="4120023" y="1714500"/>
-            <a:ext cx="2095500" cy="2847976"/>
-            <a:chOff x="4267200" y="1714500"/>
-            <a:chExt cx="2095500" cy="2847976"/>
+            <a:ext cx="2095500" cy="3217308"/>
+            <a:chOff x="4120023" y="1714500"/>
+            <a:chExt cx="2095500" cy="3217308"/>
           </a:xfrm>
         </p:grpSpPr>
-        <p:pic>
-          <p:nvPicPr>
-            <p:cNvPr id="1030" name="Picture 6" descr="http://thefilmexperience.net/storage/1970s/youngfrank-freshdead.jpg?__SQUARESPACE_CACHEVERSION=1403203337556"/>
-            <p:cNvPicPr>
-              <a:picLocks noChangeAspect="1" noChangeArrowheads="1"/>
-            </p:cNvPicPr>
+        <p:grpSp>
+          <p:nvGrpSpPr>
+            <p:cNvPr id="9" name="Group 8"/>
+            <p:cNvGrpSpPr/>
             <p:nvPr/>
-          </p:nvPicPr>
-          <p:blipFill>
-            <a:blip r:embed="rId5">
+          </p:nvGrpSpPr>
+          <p:grpSpPr>
+            <a:xfrm>
+              <a:off x="4120023" y="1714500"/>
+              <a:ext cx="2095500" cy="2847976"/>
+              <a:chOff x="4267200" y="1714500"/>
+              <a:chExt cx="2095500" cy="2847976"/>
+            </a:xfrm>
+          </p:grpSpPr>
+          <p:pic>
+            <p:nvPicPr>
+              <p:cNvPr id="1030" name="Picture 6" descr="http://thefilmexperience.net/storage/1970s/youngfrank-freshdead.jpg?__SQUARESPACE_CACHEVERSION=1403203337556"/>
+              <p:cNvPicPr>
+                <a:picLocks noChangeAspect="1" noChangeArrowheads="1"/>
+              </p:cNvPicPr>
+              <p:nvPr/>
+            </p:nvPicPr>
+            <p:blipFill>
+              <a:blip r:embed="rId6">
+                <a:extLst>
+                  <a:ext uri="{28A0092B-C50C-407E-A947-70E740481C1C}">
+                    <a14:useLocalDpi xmlns:a14="http://schemas.microsoft.com/office/drawing/2010/main" val="0"/>
+                  </a:ext>
+                </a:extLst>
+              </a:blip>
+              <a:srcRect/>
+              <a:stretch>
+                <a:fillRect/>
+              </a:stretch>
+            </p:blipFill>
+            <p:spPr bwMode="auto">
+              <a:xfrm>
+                <a:off x="4267200" y="2476500"/>
+                <a:ext cx="2095500" cy="2085976"/>
+              </a:xfrm>
+              <a:prstGeom prst="rect">
+                <a:avLst/>
+              </a:prstGeom>
+              <a:noFill/>
               <a:extLst>
-                <a:ext uri="{28A0092B-C50C-407E-A947-70E740481C1C}">
-                  <a14:useLocalDpi xmlns:a14="http://schemas.microsoft.com/office/drawing/2010/main" val="0"/>
+                <a:ext uri="{909E8E84-426E-40DD-AFC4-6F175D3DCCD1}">
+                  <a14:hiddenFill xmlns:a14="http://schemas.microsoft.com/office/drawing/2010/main">
+                    <a:solidFill>
+                      <a:srgbClr val="FFFFFF"/>
+                    </a:solidFill>
+                  </a14:hiddenFill>
                 </a:ext>
               </a:extLst>
-            </a:blip>
-            <a:srcRect/>
-            <a:stretch>
-              <a:fillRect/>
-            </a:stretch>
-          </p:blipFill>
-          <p:spPr bwMode="auto">
-            <a:xfrm>
-              <a:off x="4267200" y="2476500"/>
-              <a:ext cx="2095500" cy="2085976"/>
-            </a:xfrm>
-            <a:prstGeom prst="rect">
-              <a:avLst/>
-            </a:prstGeom>
-            <a:noFill/>
-            <a:extLst>
-              <a:ext uri="{909E8E84-426E-40DD-AFC4-6F175D3DCCD1}">
-                <a14:hiddenFill xmlns:a14="http://schemas.microsoft.com/office/drawing/2010/main">
-                  <a:solidFill>
-                    <a:srgbClr val="FFFFFF"/>
-                  </a:solidFill>
-                </a14:hiddenFill>
-              </a:ext>
-            </a:extLst>
-          </p:spPr>
-        </p:pic>
+            </p:spPr>
+          </p:pic>
+          <p:sp>
+            <p:nvSpPr>
+              <p:cNvPr id="11" name="TextBox 10"/>
+              <p:cNvSpPr txBox="1"/>
+              <p:nvPr/>
+            </p:nvSpPr>
+            <p:spPr>
+              <a:xfrm>
+                <a:off x="4402970" y="1714500"/>
+                <a:ext cx="1823961" cy="584775"/>
+              </a:xfrm>
+              <a:prstGeom prst="rect">
+                <a:avLst/>
+              </a:prstGeom>
+              <a:noFill/>
+            </p:spPr>
+            <p:txBody>
+              <a:bodyPr wrap="none" rtlCol="0">
+                <a:spAutoFit/>
+              </a:bodyPr>
+              <a:lstStyle/>
+              <a:p>
+                <a:r>
+                  <a:rPr lang="en-US" sz="3200" dirty="0" smtClean="0"/>
+                  <a:t>Too Little</a:t>
+                </a:r>
+                <a:endParaRPr lang="en-US" sz="3200" dirty="0"/>
+              </a:p>
+            </p:txBody>
+          </p:sp>
+        </p:grpSp>
         <p:sp>
           <p:nvSpPr>
-            <p:cNvPr id="11" name="TextBox 10"/>
+            <p:cNvPr id="15" name="TextBox 14"/>
             <p:cNvSpPr txBox="1"/>
             <p:nvPr/>
           </p:nvSpPr>
           <p:spPr>
             <a:xfrm>
-              <a:off x="4402970" y="1714500"/>
-              <a:ext cx="1823961" cy="584775"/>
+              <a:off x="4876667" y="4562476"/>
+              <a:ext cx="582211" cy="369332"/>
             </a:xfrm>
             <a:prstGeom prst="rect">
               <a:avLst/>
@@ -8952,38 +9476,140 @@
             <a:lstStyle/>
             <a:p>
               <a:r>
-                <a:rPr lang="en-US" sz="3200" dirty="0" smtClean="0"/>
-                <a:t>Too Little</a:t>
+                <a:rPr lang="en-US" i="0" kern="1200" dirty="0" smtClean="0"/>
+                <a:t>Igor</a:t>
               </a:r>
-              <a:endParaRPr lang="en-US" sz="3200" dirty="0"/>
+              <a:endParaRPr lang="en-US" i="0" kern="1200" dirty="0" smtClean="0"/>
             </a:p>
           </p:txBody>
         </p:sp>
       </p:grpSp>
       <p:grpSp>
         <p:nvGrpSpPr>
-          <p:cNvPr id="14" name="Group 13"/>
+          <p:cNvPr id="10" name="Group 9"/>
           <p:cNvGrpSpPr/>
           <p:nvPr/>
         </p:nvGrpSpPr>
         <p:grpSpPr>
           <a:xfrm>
             <a:off x="6532650" y="1714499"/>
-            <a:ext cx="2433592" cy="3209248"/>
-            <a:chOff x="6553200" y="1714499"/>
-            <a:chExt cx="2433592" cy="3209248"/>
+            <a:ext cx="2433592" cy="3578580"/>
+            <a:chOff x="6532650" y="1714499"/>
+            <a:chExt cx="2433592" cy="3578580"/>
           </a:xfrm>
         </p:grpSpPr>
+        <p:grpSp>
+          <p:nvGrpSpPr>
+            <p:cNvPr id="14" name="Group 13"/>
+            <p:cNvGrpSpPr/>
+            <p:nvPr/>
+          </p:nvGrpSpPr>
+          <p:grpSpPr>
+            <a:xfrm>
+              <a:off x="6532650" y="1714499"/>
+              <a:ext cx="2433592" cy="3209248"/>
+              <a:chOff x="6553200" y="1714499"/>
+              <a:chExt cx="2433592" cy="3209248"/>
+            </a:xfrm>
+          </p:grpSpPr>
+          <p:sp>
+            <p:nvSpPr>
+              <p:cNvPr id="12" name="TextBox 11"/>
+              <p:cNvSpPr txBox="1"/>
+              <p:nvPr/>
+            </p:nvSpPr>
+            <p:spPr>
+              <a:xfrm>
+                <a:off x="6766356" y="1714499"/>
+                <a:ext cx="2007281" cy="584775"/>
+              </a:xfrm>
+              <a:prstGeom prst="rect">
+                <a:avLst/>
+              </a:prstGeom>
+              <a:noFill/>
+            </p:spPr>
+            <p:txBody>
+              <a:bodyPr wrap="none" rtlCol="0">
+                <a:spAutoFit/>
+              </a:bodyPr>
+              <a:lstStyle/>
+              <a:p>
+                <a:r>
+                  <a:rPr lang="en-US" sz="3200" dirty="0" smtClean="0"/>
+                  <a:t>Just Right</a:t>
+                </a:r>
+                <a:endParaRPr lang="en-US" sz="3200" dirty="0"/>
+              </a:p>
+            </p:txBody>
+          </p:sp>
+          <p:graphicFrame>
+            <p:nvGraphicFramePr>
+              <p:cNvPr id="13" name="Object 12"/>
+              <p:cNvGraphicFramePr>
+                <a:graphicFrameLocks noChangeAspect="1"/>
+              </p:cNvGraphicFramePr>
+              <p:nvPr>
+                <p:extLst>
+                  <p:ext uri="{D42A27DB-BD31-4B8C-83A1-F6EECF244321}">
+                    <p14:modId xmlns:p14="http://schemas.microsoft.com/office/powerpoint/2010/main" val="3786977209"/>
+                  </p:ext>
+                </p:extLst>
+              </p:nvPr>
+            </p:nvGraphicFramePr>
+            <p:xfrm>
+              <a:off x="6553200" y="2472647"/>
+              <a:ext cx="2433592" cy="2451100"/>
+            </p:xfrm>
+            <a:graphic>
+              <a:graphicData uri="http://schemas.openxmlformats.org/presentationml/2006/ole">
+                <mc:AlternateContent xmlns:mc="http://schemas.openxmlformats.org/markup-compatibility/2006">
+                  <mc:Choice xmlns:v="urn:schemas-microsoft-com:vml" Requires="v">
+                    <p:oleObj spid="_x0000_s1168" name="Image" r:id="rId7" imgW="8825040" imgH="8888760" progId="PhotoshopElements.Image.10">
+                      <p:embed/>
+                    </p:oleObj>
+                  </mc:Choice>
+                  <mc:Fallback>
+                    <p:oleObj name="Image" r:id="rId7" imgW="8825040" imgH="8888760" progId="PhotoshopElements.Image.10">
+                      <p:embed/>
+                      <p:pic>
+                        <p:nvPicPr>
+                          <p:cNvPr id="0" name=""/>
+                          <p:cNvPicPr/>
+                          <p:nvPr/>
+                        </p:nvPicPr>
+                        <p:blipFill>
+                          <a:blip r:embed="rId8"/>
+                          <a:stretch>
+                            <a:fillRect/>
+                          </a:stretch>
+                        </p:blipFill>
+                        <p:spPr>
+                          <a:xfrm>
+                            <a:off x="6553200" y="2472647"/>
+                            <a:ext cx="2433592" cy="2451100"/>
+                          </a:xfrm>
+                          <a:prstGeom prst="rect">
+                            <a:avLst/>
+                          </a:prstGeom>
+                        </p:spPr>
+                      </p:pic>
+                    </p:oleObj>
+                  </mc:Fallback>
+                </mc:AlternateContent>
+              </a:graphicData>
+            </a:graphic>
+          </p:graphicFrame>
+        </p:grpSp>
         <p:sp>
           <p:nvSpPr>
-            <p:cNvPr id="12" name="TextBox 11"/>
+            <p:cNvPr id="16" name="TextBox 15"/>
             <p:cNvSpPr txBox="1"/>
             <p:nvPr/>
           </p:nvSpPr>
           <p:spPr>
             <a:xfrm>
-              <a:off x="6766356" y="1714499"/>
-              <a:ext cx="2007281" cy="584775"/>
+              <a:off x="7543800" y="4923747"/>
+              <a:ext cx="633507" cy="369332"/>
             </a:xfrm>
             <a:prstGeom prst="rect">
               <a:avLst/>
@@ -8997,70 +9623,13 @@
             <a:lstStyle/>
             <a:p>
               <a:r>
-                <a:rPr lang="en-US" sz="3200" dirty="0" smtClean="0"/>
-                <a:t>Just Right</a:t>
+                <a:rPr lang="en-US" i="0" kern="1200" dirty="0" smtClean="0"/>
+                <a:t>Inga</a:t>
               </a:r>
-              <a:endParaRPr lang="en-US" sz="3200" dirty="0"/>
+              <a:endParaRPr lang="en-US" i="0" kern="1200" dirty="0" smtClean="0"/>
             </a:p>
           </p:txBody>
         </p:sp>
-        <p:graphicFrame>
-          <p:nvGraphicFramePr>
-            <p:cNvPr id="13" name="Object 12"/>
-            <p:cNvGraphicFramePr>
-              <a:graphicFrameLocks noChangeAspect="1"/>
-            </p:cNvGraphicFramePr>
-            <p:nvPr>
-              <p:extLst>
-                <p:ext uri="{D42A27DB-BD31-4B8C-83A1-F6EECF244321}">
-                  <p14:modId xmlns:p14="http://schemas.microsoft.com/office/powerpoint/2010/main" val="3786977209"/>
-                </p:ext>
-              </p:extLst>
-            </p:nvPr>
-          </p:nvGraphicFramePr>
-          <p:xfrm>
-            <a:off x="6553200" y="2472647"/>
-            <a:ext cx="2433592" cy="2451100"/>
-          </p:xfrm>
-          <a:graphic>
-            <a:graphicData uri="http://schemas.openxmlformats.org/presentationml/2006/ole">
-              <mc:AlternateContent xmlns:mc="http://schemas.openxmlformats.org/markup-compatibility/2006">
-                <mc:Choice xmlns:v="urn:schemas-microsoft-com:vml" Requires="v">
-                  <p:oleObj spid="_x0000_s1146" name="Image" r:id="rId6" imgW="8825040" imgH="8888760" progId="PhotoshopElements.Image.10">
-                    <p:embed/>
-                  </p:oleObj>
-                </mc:Choice>
-                <mc:Fallback>
-                  <p:oleObj name="Image" r:id="rId6" imgW="8825040" imgH="8888760" progId="PhotoshopElements.Image.10">
-                    <p:embed/>
-                    <p:pic>
-                      <p:nvPicPr>
-                        <p:cNvPr id="0" name=""/>
-                        <p:cNvPicPr/>
-                        <p:nvPr/>
-                      </p:nvPicPr>
-                      <p:blipFill>
-                        <a:blip r:embed="rId7"/>
-                        <a:stretch>
-                          <a:fillRect/>
-                        </a:stretch>
-                      </p:blipFill>
-                      <p:spPr>
-                        <a:xfrm>
-                          <a:off x="6553200" y="2472647"/>
-                          <a:ext cx="2433592" cy="2451100"/>
-                        </a:xfrm>
-                        <a:prstGeom prst="rect">
-                          <a:avLst/>
-                        </a:prstGeom>
-                      </p:spPr>
-                    </p:pic>
-                  </p:oleObj>
-                </mc:Fallback>
-              </mc:AlternateContent>
-            </a:graphicData>
-          </a:graphic>
-        </p:graphicFrame>
       </p:grpSp>
     </p:spTree>
     <p:extLst>
@@ -9109,7 +9678,7 @@
                                           </p:stCondLst>
                                         </p:cTn>
                                         <p:tgtEl>
-                                          <p:spTgt spid="8"/>
+                                          <p:spTgt spid="5"/>
                                         </p:tgtEl>
                                         <p:attrNameLst>
                                           <p:attrName>style.visibility</p:attrName>
@@ -9123,7 +9692,7 @@
                                       <p:cBhvr>
                                         <p:cTn id="7" dur="500"/>
                                         <p:tgtEl>
-                                          <p:spTgt spid="8"/>
+                                          <p:spTgt spid="5"/>
                                         </p:tgtEl>
                                       </p:cBhvr>
                                     </p:animEffect>
@@ -9162,7 +9731,7 @@
                                           </p:stCondLst>
                                         </p:cTn>
                                         <p:tgtEl>
-                                          <p:spTgt spid="9"/>
+                                          <p:spTgt spid="6"/>
                                         </p:tgtEl>
                                         <p:attrNameLst>
                                           <p:attrName>style.visibility</p:attrName>
@@ -9176,7 +9745,7 @@
                                       <p:cBhvr>
                                         <p:cTn id="12" dur="500"/>
                                         <p:tgtEl>
-                                          <p:spTgt spid="9"/>
+                                          <p:spTgt spid="6"/>
                                         </p:tgtEl>
                                       </p:cBhvr>
                                     </p:animEffect>
@@ -9215,7 +9784,7 @@
                                           </p:stCondLst>
                                         </p:cTn>
                                         <p:tgtEl>
-                                          <p:spTgt spid="14"/>
+                                          <p:spTgt spid="10"/>
                                         </p:tgtEl>
                                         <p:attrNameLst>
                                           <p:attrName>style.visibility</p:attrName>
@@ -9229,7 +9798,7 @@
                                       <p:cBhvr>
                                         <p:cTn id="17" dur="2000"/>
                                         <p:tgtEl>
-                                          <p:spTgt spid="14"/>
+                                          <p:spTgt spid="10"/>
                                         </p:tgtEl>
                                       </p:cBhvr>
                                     </p:animEffect>
@@ -13736,13 +14305,19 @@
           <a:p>
             <a:r>
               <a:rPr lang="en-US" dirty="0" smtClean="0"/>
-              <a:t>He added drop recovery</a:t>
+              <a:t>He found some bugs in the C code (and reported them)</a:t>
             </a:r>
           </a:p>
           <a:p>
             <a:r>
               <a:rPr lang="en-US" dirty="0" smtClean="0"/>
-              <a:t>But he didn’t implement data logging</a:t>
+              <a:t>He added “drop recovery”</a:t>
+            </a:r>
+          </a:p>
+          <a:p>
+            <a:r>
+              <a:rPr lang="en-US" dirty="0" smtClean="0"/>
+              <a:t>But he didn’t implement data logging and a few minor things (e.g., a blinking LED)</a:t>
             </a:r>
           </a:p>
           <a:p>
@@ -14690,20 +15265,13 @@
             </a:pPr>
             <a:r>
               <a:rPr lang="en-US" dirty="0" smtClean="0"/>
-              <a:t>Proving absence of run-time </a:t>
-            </a:r>
-            <a:r>
-              <a:rPr lang="en-US" dirty="0"/>
-              <a:t>errors (“</a:t>
-            </a:r>
-            <a:r>
-              <a:rPr lang="en-US" dirty="0" err="1" smtClean="0"/>
-              <a:t>AoRTE</a:t>
-            </a:r>
-            <a:r>
-              <a:rPr lang="en-US" dirty="0" smtClean="0"/>
-              <a:t>”)</a:t>
-            </a:r>
+              <a:t>Proving absence of </a:t>
+            </a:r>
+            <a:r>
+              <a:rPr lang="en-US" smtClean="0"/>
+              <a:t>run-time errors</a:t>
+            </a:r>
+            <a:endParaRPr lang="en-US" dirty="0" smtClean="0"/>
           </a:p>
           <a:p>
             <a:pPr lvl="1"/>
@@ -15148,6 +15716,545 @@
       </p:grpSpPr>
       <p:sp>
         <p:nvSpPr>
+          <p:cNvPr id="3" name="Title 2"/>
+          <p:cNvSpPr>
+            <a:spLocks noGrp="1"/>
+          </p:cNvSpPr>
+          <p:nvPr>
+            <p:ph type="title"/>
+          </p:nvPr>
+        </p:nvSpPr>
+        <p:spPr/>
+        <p:txBody>
+          <a:bodyPr/>
+          <a:lstStyle/>
+          <a:p>
+            <a:r>
+              <a:rPr lang="en-US" dirty="0" smtClean="0"/>
+              <a:t>Contracts As </a:t>
+            </a:r>
+            <a:r>
+              <a:rPr lang="en-US" dirty="0" smtClean="0"/>
+              <a:t>Provable </a:t>
+            </a:r>
+            <a:r>
+              <a:rPr lang="en-US" dirty="0" smtClean="0"/>
+              <a:t>Unit Tests</a:t>
+            </a:r>
+            <a:endParaRPr lang="en-US" dirty="0"/>
+          </a:p>
+        </p:txBody>
+      </p:sp>
+      <p:sp>
+        <p:nvSpPr>
+          <p:cNvPr id="4" name="TextBox 3"/>
+          <p:cNvSpPr txBox="1"/>
+          <p:nvPr/>
+        </p:nvSpPr>
+        <p:spPr>
+          <a:xfrm>
+            <a:off x="1272045" y="952500"/>
+            <a:ext cx="5889433" cy="4624343"/>
+          </a:xfrm>
+          <a:prstGeom prst="rect">
+            <a:avLst/>
+          </a:prstGeom>
+          <a:noFill/>
+        </p:spPr>
+        <p:txBody>
+          <a:bodyPr wrap="none" rtlCol="0">
+            <a:spAutoFit/>
+          </a:bodyPr>
+          <a:lstStyle/>
+          <a:p>
+            <a:pPr>
+              <a:tabLst>
+                <a:tab pos="235470" algn="l"/>
+                <a:tab pos="572800" algn="l"/>
+                <a:tab pos="903516" algn="l"/>
+              </a:tabLst>
+            </a:pPr>
+            <a:r>
+              <a:rPr lang="en-US" b="1" noProof="1" smtClean="0">
+                <a:latin typeface="Calibri" pitchFamily="34" charset="0"/>
+              </a:rPr>
+              <a:t>procedure </a:t>
+            </a:r>
+            <a:r>
+              <a:rPr lang="en-US" noProof="1" smtClean="0">
+                <a:latin typeface="Calibri" pitchFamily="34" charset="0"/>
+              </a:rPr>
+              <a:t>Pop (This : </a:t>
+            </a:r>
+            <a:r>
+              <a:rPr lang="en-US" b="1" noProof="1" smtClean="0">
+                <a:latin typeface="Calibri" pitchFamily="34" charset="0"/>
+              </a:rPr>
+              <a:t>in out </a:t>
+            </a:r>
+            <a:r>
+              <a:rPr lang="en-US" noProof="1" smtClean="0">
+                <a:latin typeface="Calibri" pitchFamily="34" charset="0"/>
+              </a:rPr>
+              <a:t>Stack;  Value : </a:t>
+            </a:r>
+            <a:r>
+              <a:rPr lang="en-US" b="1" noProof="1" smtClean="0">
+                <a:latin typeface="Calibri" pitchFamily="34" charset="0"/>
+              </a:rPr>
+              <a:t>out </a:t>
+            </a:r>
+            <a:r>
+              <a:rPr lang="en-US" noProof="1" smtClean="0">
+                <a:latin typeface="Calibri" pitchFamily="34" charset="0"/>
+              </a:rPr>
+              <a:t>Content) </a:t>
+            </a:r>
+            <a:r>
+              <a:rPr lang="en-US" b="1" noProof="1" smtClean="0">
+                <a:latin typeface="Calibri" pitchFamily="34" charset="0"/>
+              </a:rPr>
+              <a:t>with</a:t>
+            </a:r>
+          </a:p>
+          <a:p>
+            <a:pPr>
+              <a:spcBef>
+                <a:spcPts val="400"/>
+              </a:spcBef>
+              <a:tabLst>
+                <a:tab pos="234950" algn="l"/>
+                <a:tab pos="571500" algn="l"/>
+                <a:tab pos="739775" algn="l"/>
+                <a:tab pos="903288" algn="l"/>
+                <a:tab pos="1089025" algn="l"/>
+              </a:tabLst>
+            </a:pPr>
+            <a:r>
+              <a:rPr lang="en-US" noProof="1" smtClean="0">
+                <a:latin typeface="Calibri" pitchFamily="34" charset="0"/>
+              </a:rPr>
+              <a:t>	Pre  	=&gt; 	</a:t>
+            </a:r>
+            <a:r>
+              <a:rPr lang="en-US" b="1" noProof="1" smtClean="0">
+                <a:latin typeface="Calibri" pitchFamily="34" charset="0"/>
+              </a:rPr>
+              <a:t>not </a:t>
+            </a:r>
+            <a:r>
+              <a:rPr lang="en-US" noProof="1" smtClean="0">
+                <a:latin typeface="Calibri" pitchFamily="34" charset="0"/>
+              </a:rPr>
+              <a:t>Empty (This),           </a:t>
+            </a:r>
+          </a:p>
+          <a:p>
+            <a:pPr>
+              <a:spcBef>
+                <a:spcPts val="400"/>
+              </a:spcBef>
+              <a:tabLst>
+                <a:tab pos="234950" algn="l"/>
+                <a:tab pos="571500" algn="l"/>
+                <a:tab pos="739775" algn="l"/>
+                <a:tab pos="903288" algn="l"/>
+                <a:tab pos="1089025" algn="l"/>
+              </a:tabLst>
+            </a:pPr>
+            <a:r>
+              <a:rPr lang="en-US" noProof="1" smtClean="0">
+                <a:latin typeface="Calibri" pitchFamily="34" charset="0"/>
+              </a:rPr>
+              <a:t>	Post 	=&gt; 	</a:t>
+            </a:r>
+            <a:r>
+              <a:rPr lang="en-US" b="1" noProof="1" smtClean="0">
+                <a:latin typeface="Calibri" pitchFamily="34" charset="0"/>
+              </a:rPr>
+              <a:t>not </a:t>
+            </a:r>
+            <a:r>
+              <a:rPr lang="en-US" noProof="1" smtClean="0">
+                <a:latin typeface="Calibri" pitchFamily="34" charset="0"/>
+              </a:rPr>
+              <a:t>Full (This) </a:t>
+            </a:r>
+            <a:r>
+              <a:rPr lang="en-US" b="1" noProof="1" smtClean="0">
+                <a:latin typeface="Calibri" pitchFamily="34" charset="0"/>
+              </a:rPr>
+              <a:t>and</a:t>
+            </a:r>
+          </a:p>
+          <a:p>
+            <a:pPr>
+              <a:spcBef>
+                <a:spcPts val="400"/>
+              </a:spcBef>
+              <a:tabLst>
+                <a:tab pos="234950" algn="l"/>
+                <a:tab pos="571500" algn="l"/>
+                <a:tab pos="739775" algn="l"/>
+                <a:tab pos="903288" algn="l"/>
+                <a:tab pos="1089025" algn="l"/>
+              </a:tabLst>
+            </a:pPr>
+            <a:r>
+              <a:rPr lang="en-US" b="1" noProof="1" smtClean="0">
+                <a:latin typeface="Calibri" pitchFamily="34" charset="0"/>
+              </a:rPr>
+              <a:t>              			</a:t>
+            </a:r>
+            <a:r>
+              <a:rPr lang="en-US" noProof="1" smtClean="0">
+                <a:latin typeface="Calibri" pitchFamily="34" charset="0"/>
+              </a:rPr>
+              <a:t>Extent (This) = Extent (This'Old) - 1;</a:t>
+            </a:r>
+          </a:p>
+          <a:p>
+            <a:pPr>
+              <a:tabLst>
+                <a:tab pos="235470" algn="l"/>
+                <a:tab pos="572800" algn="l"/>
+                <a:tab pos="903516" algn="l"/>
+              </a:tabLst>
+            </a:pPr>
+            <a:endParaRPr lang="en-US" noProof="1" smtClean="0">
+              <a:latin typeface="Calibri" pitchFamily="34" charset="0"/>
+            </a:endParaRPr>
+          </a:p>
+          <a:p>
+            <a:pPr>
+              <a:tabLst>
+                <a:tab pos="235470" algn="l"/>
+                <a:tab pos="572800" algn="l"/>
+                <a:tab pos="903516" algn="l"/>
+              </a:tabLst>
+            </a:pPr>
+            <a:r>
+              <a:rPr lang="en-US" b="1" noProof="1" smtClean="0">
+                <a:latin typeface="Calibri" pitchFamily="34" charset="0"/>
+              </a:rPr>
+              <a:t>procedure </a:t>
+            </a:r>
+            <a:r>
+              <a:rPr lang="en-US" noProof="1" smtClean="0">
+                <a:latin typeface="Calibri" pitchFamily="34" charset="0"/>
+              </a:rPr>
+              <a:t>Push (This : </a:t>
+            </a:r>
+            <a:r>
+              <a:rPr lang="en-US" b="1" noProof="1" smtClean="0">
+                <a:latin typeface="Calibri" pitchFamily="34" charset="0"/>
+              </a:rPr>
+              <a:t>in out </a:t>
+            </a:r>
+            <a:r>
+              <a:rPr lang="en-US" noProof="1" smtClean="0">
+                <a:latin typeface="Calibri" pitchFamily="34" charset="0"/>
+              </a:rPr>
+              <a:t>Stack;  Value : Content) </a:t>
+            </a:r>
+            <a:r>
+              <a:rPr lang="en-US" b="1" noProof="1" smtClean="0">
+                <a:latin typeface="Calibri" pitchFamily="34" charset="0"/>
+              </a:rPr>
+              <a:t>with</a:t>
+            </a:r>
+          </a:p>
+          <a:p>
+            <a:pPr>
+              <a:spcBef>
+                <a:spcPts val="400"/>
+              </a:spcBef>
+              <a:tabLst>
+                <a:tab pos="234950" algn="l"/>
+                <a:tab pos="525463" algn="l"/>
+                <a:tab pos="742950" algn="l"/>
+                <a:tab pos="1085850" algn="l"/>
+              </a:tabLst>
+            </a:pPr>
+            <a:r>
+              <a:rPr lang="en-US" noProof="1" smtClean="0">
+                <a:latin typeface="Calibri" pitchFamily="34" charset="0"/>
+              </a:rPr>
+              <a:t>	Pre  	=&gt;	</a:t>
+            </a:r>
+            <a:r>
+              <a:rPr lang="en-US" b="1" noProof="1" smtClean="0">
+                <a:latin typeface="Calibri" pitchFamily="34" charset="0"/>
+              </a:rPr>
+              <a:t>not </a:t>
+            </a:r>
+            <a:r>
+              <a:rPr lang="en-US" noProof="1" smtClean="0">
+                <a:latin typeface="Calibri" pitchFamily="34" charset="0"/>
+              </a:rPr>
+              <a:t>Full (This),</a:t>
+            </a:r>
+          </a:p>
+          <a:p>
+            <a:pPr>
+              <a:spcBef>
+                <a:spcPts val="400"/>
+              </a:spcBef>
+              <a:tabLst>
+                <a:tab pos="234950" algn="l"/>
+                <a:tab pos="525463" algn="l"/>
+                <a:tab pos="742950" algn="l"/>
+                <a:tab pos="1085850" algn="l"/>
+              </a:tabLst>
+            </a:pPr>
+            <a:r>
+              <a:rPr lang="en-US" noProof="1" smtClean="0">
+                <a:latin typeface="Calibri" pitchFamily="34" charset="0"/>
+              </a:rPr>
+              <a:t>	Post	=&gt;	</a:t>
+            </a:r>
+            <a:r>
+              <a:rPr lang="en-US" b="1" noProof="1" smtClean="0">
+                <a:latin typeface="Calibri" pitchFamily="34" charset="0"/>
+              </a:rPr>
+              <a:t>not </a:t>
+            </a:r>
+            <a:r>
+              <a:rPr lang="en-US" noProof="1" smtClean="0">
+                <a:latin typeface="Calibri" pitchFamily="34" charset="0"/>
+              </a:rPr>
+              <a:t>Empty (This) </a:t>
+            </a:r>
+            <a:r>
+              <a:rPr lang="en-US" b="1" noProof="1" smtClean="0">
+                <a:latin typeface="Calibri" pitchFamily="34" charset="0"/>
+              </a:rPr>
+              <a:t>and</a:t>
+            </a:r>
+          </a:p>
+          <a:p>
+            <a:pPr>
+              <a:spcBef>
+                <a:spcPts val="400"/>
+              </a:spcBef>
+              <a:tabLst>
+                <a:tab pos="234950" algn="l"/>
+                <a:tab pos="525463" algn="l"/>
+                <a:tab pos="742950" algn="l"/>
+                <a:tab pos="1085850" algn="l"/>
+              </a:tabLst>
+            </a:pPr>
+            <a:r>
+              <a:rPr lang="en-US" b="1" noProof="1" smtClean="0">
+                <a:latin typeface="Calibri" pitchFamily="34" charset="0"/>
+              </a:rPr>
+              <a:t>				</a:t>
+            </a:r>
+            <a:r>
+              <a:rPr lang="en-US" noProof="1" smtClean="0">
+                <a:latin typeface="Calibri" pitchFamily="34" charset="0"/>
+              </a:rPr>
+              <a:t>Top (This) = Value </a:t>
+            </a:r>
+            <a:r>
+              <a:rPr lang="en-US" b="1" noProof="1" smtClean="0">
+                <a:latin typeface="Calibri" pitchFamily="34" charset="0"/>
+              </a:rPr>
+              <a:t>and</a:t>
+            </a:r>
+          </a:p>
+          <a:p>
+            <a:pPr>
+              <a:spcBef>
+                <a:spcPts val="400"/>
+              </a:spcBef>
+              <a:tabLst>
+                <a:tab pos="234950" algn="l"/>
+                <a:tab pos="525463" algn="l"/>
+                <a:tab pos="742950" algn="l"/>
+                <a:tab pos="1085850" algn="l"/>
+              </a:tabLst>
+            </a:pPr>
+            <a:r>
+              <a:rPr lang="en-US" noProof="1" smtClean="0">
+                <a:latin typeface="Calibri" pitchFamily="34" charset="0"/>
+              </a:rPr>
+              <a:t>				Extent (This) = Extent (This'Old) + 1;</a:t>
+            </a:r>
+          </a:p>
+          <a:p>
+            <a:pPr>
+              <a:spcBef>
+                <a:spcPts val="500"/>
+              </a:spcBef>
+              <a:tabLst>
+                <a:tab pos="235470" algn="l"/>
+                <a:tab pos="572800" algn="l"/>
+                <a:tab pos="903516" algn="l"/>
+              </a:tabLst>
+            </a:pPr>
+            <a:r>
+              <a:rPr lang="en-US" noProof="1" smtClean="0">
+                <a:latin typeface="Calibri" pitchFamily="34" charset="0"/>
+              </a:rPr>
+              <a:t>…</a:t>
+            </a:r>
+          </a:p>
+          <a:p>
+            <a:pPr>
+              <a:spcBef>
+                <a:spcPts val="600"/>
+              </a:spcBef>
+              <a:tabLst>
+                <a:tab pos="235470" algn="l"/>
+                <a:tab pos="572800" algn="l"/>
+                <a:tab pos="903516" algn="l"/>
+              </a:tabLst>
+            </a:pPr>
+            <a:r>
+              <a:rPr lang="en-US" b="1" noProof="1" smtClean="0">
+                <a:latin typeface="Calibri" pitchFamily="34" charset="0"/>
+              </a:rPr>
+              <a:t>function </a:t>
+            </a:r>
+            <a:r>
+              <a:rPr lang="en-US" noProof="1" smtClean="0">
+                <a:latin typeface="Calibri" pitchFamily="34" charset="0"/>
+              </a:rPr>
+              <a:t>Top (This : Stack) </a:t>
+            </a:r>
+            <a:r>
+              <a:rPr lang="en-US" b="1" noProof="1" smtClean="0">
+                <a:latin typeface="Calibri" pitchFamily="34" charset="0"/>
+              </a:rPr>
+              <a:t>return </a:t>
+            </a:r>
+            <a:r>
+              <a:rPr lang="en-US" noProof="1" smtClean="0">
+                <a:latin typeface="Calibri" pitchFamily="34" charset="0"/>
+              </a:rPr>
+              <a:t>Content;</a:t>
+            </a:r>
+          </a:p>
+          <a:p>
+            <a:pPr>
+              <a:spcBef>
+                <a:spcPts val="600"/>
+              </a:spcBef>
+              <a:tabLst>
+                <a:tab pos="235470" algn="l"/>
+                <a:tab pos="572800" algn="l"/>
+                <a:tab pos="903516" algn="l"/>
+              </a:tabLst>
+            </a:pPr>
+            <a:r>
+              <a:rPr lang="en-US" b="1" noProof="1" smtClean="0">
+                <a:latin typeface="Calibri" pitchFamily="34" charset="0"/>
+              </a:rPr>
+              <a:t>function </a:t>
+            </a:r>
+            <a:r>
+              <a:rPr lang="en-US" noProof="1" smtClean="0">
+                <a:latin typeface="Calibri" pitchFamily="34" charset="0"/>
+              </a:rPr>
+              <a:t>Full (This : Stack) </a:t>
+            </a:r>
+            <a:r>
+              <a:rPr lang="en-US" b="1" noProof="1" smtClean="0">
+                <a:latin typeface="Calibri" pitchFamily="34" charset="0"/>
+              </a:rPr>
+              <a:t>return </a:t>
+            </a:r>
+            <a:r>
+              <a:rPr lang="en-US" noProof="1" smtClean="0">
+                <a:latin typeface="Calibri" pitchFamily="34" charset="0"/>
+              </a:rPr>
+              <a:t>Boolean;</a:t>
+            </a:r>
+          </a:p>
+          <a:p>
+            <a:pPr>
+              <a:spcBef>
+                <a:spcPts val="600"/>
+              </a:spcBef>
+              <a:tabLst>
+                <a:tab pos="235470" algn="l"/>
+                <a:tab pos="572800" algn="l"/>
+                <a:tab pos="903516" algn="l"/>
+              </a:tabLst>
+            </a:pPr>
+            <a:r>
+              <a:rPr lang="en-US" b="1" noProof="1" smtClean="0">
+                <a:latin typeface="Calibri" pitchFamily="34" charset="0"/>
+              </a:rPr>
+              <a:t>function </a:t>
+            </a:r>
+            <a:r>
+              <a:rPr lang="en-US" noProof="1" smtClean="0">
+                <a:latin typeface="Calibri" pitchFamily="34" charset="0"/>
+              </a:rPr>
+              <a:t>Extent (This : Stack) </a:t>
+            </a:r>
+            <a:r>
+              <a:rPr lang="en-US" b="1" noProof="1" smtClean="0">
+                <a:latin typeface="Calibri" pitchFamily="34" charset="0"/>
+              </a:rPr>
+              <a:t>return </a:t>
+            </a:r>
+            <a:r>
+              <a:rPr lang="en-US" noProof="1" smtClean="0">
+                <a:latin typeface="Calibri" pitchFamily="34" charset="0"/>
+              </a:rPr>
+              <a:t>Natural;</a:t>
+            </a:r>
+            <a:endParaRPr lang="en-US" noProof="1">
+              <a:latin typeface="Calibri" pitchFamily="34" charset="0"/>
+            </a:endParaRPr>
+          </a:p>
+        </p:txBody>
+      </p:sp>
+    </p:spTree>
+    <p:extLst>
+      <p:ext uri="{BB962C8B-B14F-4D97-AF65-F5344CB8AC3E}">
+        <p14:creationId xmlns:p14="http://schemas.microsoft.com/office/powerpoint/2010/main" val="2795037435"/>
+      </p:ext>
+    </p:extLst>
+  </p:cSld>
+  <p:clrMapOvr>
+    <a:masterClrMapping/>
+  </p:clrMapOvr>
+  <p:transition spd="slow">
+    <p:wipe dir="d"/>
+  </p:transition>
+  <p:timing>
+    <p:tnLst>
+      <p:par>
+        <p:cTn id="1" dur="indefinite" restart="never" nodeType="tmRoot"/>
+      </p:par>
+    </p:tnLst>
+  </p:timing>
+</p:sld>
+</file>
+
+<file path=ppt/slides/slide32.xml><?xml version="1.0" encoding="utf-8"?>
+<p:sld xmlns:a="http://schemas.openxmlformats.org/drawingml/2006/main" xmlns:r="http://schemas.openxmlformats.org/officeDocument/2006/relationships" xmlns:p="http://schemas.openxmlformats.org/presentationml/2006/main">
+  <p:cSld>
+    <p:spTree>
+      <p:nvGrpSpPr>
+        <p:cNvPr id="1" name=""/>
+        <p:cNvGrpSpPr/>
+        <p:nvPr/>
+      </p:nvGrpSpPr>
+      <p:grpSpPr>
+        <a:xfrm>
+          <a:off x="0" y="0"/>
+          <a:ext cx="0" cy="0"/>
+          <a:chOff x="0" y="0"/>
+          <a:chExt cx="0" cy="0"/>
+        </a:xfrm>
+      </p:grpSpPr>
+      <p:sp>
+        <p:nvSpPr>
           <p:cNvPr id="3" name="Content Placeholder 2"/>
           <p:cNvSpPr>
             <a:spLocks noGrp="1"/>
@@ -15162,34 +16269,41 @@
           <a:lstStyle/>
           <a:p>
             <a:r>
-              <a:rPr lang="en-US" smtClean="0"/>
+              <a:rPr lang="en-US" dirty="0" smtClean="0"/>
               <a:t>How safe/secure/reliable must your software be?</a:t>
             </a:r>
           </a:p>
           <a:p>
             <a:r>
-              <a:rPr lang="en-US" smtClean="0"/>
+              <a:rPr lang="en-US" dirty="0" smtClean="0"/>
               <a:t>You can do anything with any language – but at what cost?</a:t>
             </a:r>
           </a:p>
           <a:p>
             <a:r>
-              <a:rPr lang="en-US" smtClean="0"/>
+              <a:rPr lang="en-US" dirty="0" smtClean="0"/>
               <a:t>High reliability at reasonable cost is demonstrable now</a:t>
             </a:r>
           </a:p>
           <a:p>
             <a:r>
-              <a:rPr lang="en-US" smtClean="0"/>
+              <a:rPr lang="en-US" dirty="0" smtClean="0"/>
               <a:t>You don’t need a new team to get there</a:t>
             </a:r>
           </a:p>
           <a:p>
             <a:r>
-              <a:rPr lang="en-US" smtClean="0"/>
-              <a:t>Come drop a Crazyflie at the AdaCore booth</a:t>
-            </a:r>
-            <a:endParaRPr lang="en-US" dirty="0" smtClean="0"/>
+              <a:rPr lang="en-US" dirty="0" smtClean="0"/>
+              <a:t>Come drop a </a:t>
+            </a:r>
+            <a:r>
+              <a:rPr lang="en-US" dirty="0" err="1" smtClean="0"/>
+              <a:t>Crazyflie</a:t>
+            </a:r>
+            <a:r>
+              <a:rPr lang="en-US" dirty="0" smtClean="0"/>
+              <a:t> at the AdaCore booth</a:t>
+            </a:r>
           </a:p>
         </p:txBody>
       </p:sp>
@@ -15959,270 +17073,30 @@
           </a:p>
         </p:txBody>
       </p:sp>
-      <p:grpSp>
-        <p:nvGrpSpPr>
-          <p:cNvPr id="2" name="Group 1"/>
-          <p:cNvGrpSpPr/>
-          <p:nvPr/>
-        </p:nvGrpSpPr>
-        <p:grpSpPr>
-          <a:xfrm>
-            <a:off x="1222375" y="1943100"/>
-            <a:ext cx="6651625" cy="3735917"/>
-            <a:chOff x="552450" y="2146300"/>
-            <a:chExt cx="7981950" cy="4483100"/>
-          </a:xfrm>
-        </p:grpSpPr>
-        <p:graphicFrame>
-          <p:nvGraphicFramePr>
-            <p:cNvPr id="26628" name="Object 8"/>
-            <p:cNvGraphicFramePr>
-              <a:graphicFrameLocks noChangeAspect="1"/>
-            </p:cNvGraphicFramePr>
-            <p:nvPr>
-              <p:extLst/>
-            </p:nvPr>
-          </p:nvGraphicFramePr>
-          <p:xfrm>
-            <a:off x="552450" y="2146300"/>
-            <a:ext cx="7981950" cy="4483100"/>
-          </p:xfrm>
-          <a:graphic>
-            <a:graphicData uri="http://schemas.openxmlformats.org/presentationml/2006/ole">
-              <mc:AlternateContent xmlns:mc="http://schemas.openxmlformats.org/markup-compatibility/2006">
-                <mc:Choice xmlns:v="urn:schemas-microsoft-com:vml" Requires="v">
-                  <p:oleObj spid="_x0000_s2075" r:id="rId5" imgW="7980356" imgH="4487045" progId="Excel.Chart.8">
-                    <p:embed/>
-                  </p:oleObj>
-                </mc:Choice>
-                <mc:Fallback>
-                  <p:oleObj r:id="rId5" imgW="7980356" imgH="4487045" progId="Excel.Chart.8">
-                    <p:embed/>
-                    <p:pic>
-                      <p:nvPicPr>
-                        <p:cNvPr id="0" name=""/>
-                        <p:cNvPicPr>
-                          <a:picLocks noChangeAspect="1" noChangeArrowheads="1"/>
-                        </p:cNvPicPr>
-                        <p:nvPr/>
-                      </p:nvPicPr>
-                      <p:blipFill>
-                        <a:blip r:embed="rId6">
-                          <a:extLst>
-                            <a:ext uri="{28A0092B-C50C-407E-A947-70E740481C1C}">
-                              <a14:useLocalDpi xmlns:a14="http://schemas.microsoft.com/office/drawing/2010/main" val="0"/>
-                            </a:ext>
-                          </a:extLst>
-                        </a:blip>
-                        <a:srcRect/>
-                        <a:stretch>
-                          <a:fillRect/>
-                        </a:stretch>
-                      </p:blipFill>
-                      <p:spPr bwMode="auto">
-                        <a:xfrm>
-                          <a:off x="552450" y="2146300"/>
-                          <a:ext cx="7981950" cy="4483100"/>
-                        </a:xfrm>
-                        <a:prstGeom prst="rect">
-                          <a:avLst/>
-                        </a:prstGeom>
-                        <a:noFill/>
-                        <a:ln>
-                          <a:noFill/>
-                        </a:ln>
-                        <a:extLst>
-                          <a:ext uri="{909E8E84-426E-40DD-AFC4-6F175D3DCCD1}">
-                            <a14:hiddenFill xmlns:a14="http://schemas.microsoft.com/office/drawing/2010/main">
-                              <a:solidFill>
-                                <a:srgbClr val="FFFFFF"/>
-                              </a:solidFill>
-                            </a14:hiddenFill>
-                          </a:ext>
-                          <a:ext uri="{91240B29-F687-4F45-9708-019B960494DF}">
-                            <a14:hiddenLine xmlns:a14="http://schemas.microsoft.com/office/drawing/2010/main" w="9525">
-                              <a:solidFill>
-                                <a:srgbClr val="000000"/>
-                              </a:solidFill>
-                              <a:miter lim="800000"/>
-                              <a:headEnd/>
-                              <a:tailEnd/>
-                            </a14:hiddenLine>
-                          </a:ext>
-                        </a:extLst>
-                      </p:spPr>
-                    </p:pic>
-                  </p:oleObj>
-                </mc:Fallback>
-              </mc:AlternateContent>
-            </a:graphicData>
-          </a:graphic>
-        </p:graphicFrame>
-        <p:sp>
-          <p:nvSpPr>
-            <p:cNvPr id="26629" name="Text Box 9"/>
-            <p:cNvSpPr txBox="1">
-              <a:spLocks noChangeArrowheads="1"/>
-            </p:cNvSpPr>
-            <p:nvPr/>
-          </p:nvSpPr>
-          <p:spPr bwMode="blackWhite">
-            <a:xfrm>
-              <a:off x="2667000" y="2514600"/>
-              <a:ext cx="4113049" cy="249299"/>
-            </a:xfrm>
-            <a:prstGeom prst="rect">
-              <a:avLst/>
-            </a:prstGeom>
-            <a:noFill/>
-            <a:ln>
-              <a:noFill/>
-            </a:ln>
-            <a:extLst>
-              <a:ext uri="{909E8E84-426E-40DD-AFC4-6F175D3DCCD1}">
-                <a14:hiddenFill xmlns:a14="http://schemas.microsoft.com/office/drawing/2010/main">
-                  <a:solidFill>
-                    <a:srgbClr val="FFFFFF"/>
-                  </a:solidFill>
-                </a14:hiddenFill>
-              </a:ext>
-              <a:ext uri="{91240B29-F687-4F45-9708-019B960494DF}">
-                <a14:hiddenLine xmlns:a14="http://schemas.microsoft.com/office/drawing/2010/main" w="12700" algn="ctr">
-                  <a:solidFill>
-                    <a:srgbClr val="000000"/>
-                  </a:solidFill>
-                  <a:miter lim="800000"/>
-                  <a:headEnd/>
-                  <a:tailEnd/>
-                </a14:hiddenLine>
-              </a:ext>
-            </a:extLst>
-          </p:spPr>
-          <p:txBody>
-            <a:bodyPr wrap="none">
-              <a:spAutoFit/>
-            </a:bodyPr>
-            <a:lstStyle>
-              <a:lvl1pPr eaLnBrk="0" hangingPunct="0">
-                <a:defRPr>
-                  <a:solidFill>
-                    <a:schemeClr val="tx1"/>
-                  </a:solidFill>
-                  <a:latin typeface="Arial" pitchFamily="34" charset="0"/>
-                </a:defRPr>
-              </a:lvl1pPr>
-              <a:lvl2pPr marL="742950" indent="-285750" eaLnBrk="0" hangingPunct="0">
-                <a:defRPr>
-                  <a:solidFill>
-                    <a:schemeClr val="tx1"/>
-                  </a:solidFill>
-                  <a:latin typeface="Arial" pitchFamily="34" charset="0"/>
-                </a:defRPr>
-              </a:lvl2pPr>
-              <a:lvl3pPr marL="1143000" indent="-228600" eaLnBrk="0" hangingPunct="0">
-                <a:defRPr>
-                  <a:solidFill>
-                    <a:schemeClr val="tx1"/>
-                  </a:solidFill>
-                  <a:latin typeface="Arial" pitchFamily="34" charset="0"/>
-                </a:defRPr>
-              </a:lvl3pPr>
-              <a:lvl4pPr marL="1600200" indent="-228600" eaLnBrk="0" hangingPunct="0">
-                <a:defRPr>
-                  <a:solidFill>
-                    <a:schemeClr val="tx1"/>
-                  </a:solidFill>
-                  <a:latin typeface="Arial" pitchFamily="34" charset="0"/>
-                </a:defRPr>
-              </a:lvl4pPr>
-              <a:lvl5pPr marL="2057400" indent="-228600" eaLnBrk="0" hangingPunct="0">
-                <a:defRPr>
-                  <a:solidFill>
-                    <a:schemeClr val="tx1"/>
-                  </a:solidFill>
-                  <a:latin typeface="Arial" pitchFamily="34" charset="0"/>
-                </a:defRPr>
-              </a:lvl5pPr>
-              <a:lvl6pPr marL="2514600" indent="-228600" eaLnBrk="0" fontAlgn="base" hangingPunct="0">
-                <a:spcBef>
-                  <a:spcPct val="0"/>
-                </a:spcBef>
-                <a:spcAft>
-                  <a:spcPct val="0"/>
-                </a:spcAft>
-                <a:defRPr>
-                  <a:solidFill>
-                    <a:schemeClr val="tx1"/>
-                  </a:solidFill>
-                  <a:latin typeface="Arial" pitchFamily="34" charset="0"/>
-                </a:defRPr>
-              </a:lvl6pPr>
-              <a:lvl7pPr marL="2971800" indent="-228600" eaLnBrk="0" fontAlgn="base" hangingPunct="0">
-                <a:spcBef>
-                  <a:spcPct val="0"/>
-                </a:spcBef>
-                <a:spcAft>
-                  <a:spcPct val="0"/>
-                </a:spcAft>
-                <a:defRPr>
-                  <a:solidFill>
-                    <a:schemeClr val="tx1"/>
-                  </a:solidFill>
-                  <a:latin typeface="Arial" pitchFamily="34" charset="0"/>
-                </a:defRPr>
-              </a:lvl7pPr>
-              <a:lvl8pPr marL="3429000" indent="-228600" eaLnBrk="0" fontAlgn="base" hangingPunct="0">
-                <a:spcBef>
-                  <a:spcPct val="0"/>
-                </a:spcBef>
-                <a:spcAft>
-                  <a:spcPct val="0"/>
-                </a:spcAft>
-                <a:defRPr>
-                  <a:solidFill>
-                    <a:schemeClr val="tx1"/>
-                  </a:solidFill>
-                  <a:latin typeface="Arial" pitchFamily="34" charset="0"/>
-                </a:defRPr>
-              </a:lvl8pPr>
-              <a:lvl9pPr marL="3886200" indent="-228600" eaLnBrk="0" fontAlgn="base" hangingPunct="0">
-                <a:spcBef>
-                  <a:spcPct val="0"/>
-                </a:spcBef>
-                <a:spcAft>
-                  <a:spcPct val="0"/>
-                </a:spcAft>
-                <a:defRPr>
-                  <a:solidFill>
-                    <a:schemeClr val="tx1"/>
-                  </a:solidFill>
-                  <a:latin typeface="Arial" pitchFamily="34" charset="0"/>
-                </a:defRPr>
-              </a:lvl9pPr>
-            </a:lstStyle>
-            <a:p>
-              <a:pPr>
-                <a:spcBef>
-                  <a:spcPct val="30000"/>
-                </a:spcBef>
-              </a:pPr>
-              <a:r>
-                <a:rPr kumimoji="1" lang="en-US" sz="750"/>
-                <a:t>Source: Barry Boehm, </a:t>
-              </a:r>
-              <a:r>
-                <a:rPr kumimoji="1" lang="en-US" sz="750" i="1"/>
-                <a:t>Software Engineering Economics</a:t>
-              </a:r>
-              <a:r>
-                <a:rPr kumimoji="1" lang="en-US" sz="750"/>
-                <a:t>, Prentice Hall, 1981</a:t>
-              </a:r>
-              <a:endParaRPr lang="en-US" sz="750"/>
-            </a:p>
-          </p:txBody>
-        </p:sp>
-      </p:grpSp>
+      <p:graphicFrame>
+        <p:nvGraphicFramePr>
+          <p:cNvPr id="3" name="Object 8"/>
+          <p:cNvGraphicFramePr>
+            <a:graphicFrameLocks noChangeAspect="1"/>
+          </p:cNvGraphicFramePr>
+          <p:nvPr>
+            <p:extLst>
+              <p:ext uri="{D42A27DB-BD31-4B8C-83A1-F6EECF244321}">
+                <p14:modId xmlns:p14="http://schemas.microsoft.com/office/powerpoint/2010/main" val="3488099872"/>
+              </p:ext>
+            </p:extLst>
+          </p:nvPr>
+        </p:nvGraphicFramePr>
+        <p:xfrm>
+          <a:off x="1273175" y="1993900"/>
+          <a:ext cx="6550025" cy="3634317"/>
+        </p:xfrm>
+        <a:graphic>
+          <a:graphicData uri="http://schemas.openxmlformats.org/drawingml/2006/chart">
+            <c:chart xmlns:c="http://schemas.openxmlformats.org/drawingml/2006/chart" xmlns:r="http://schemas.openxmlformats.org/officeDocument/2006/relationships" r:id="rId3"/>
+          </a:graphicData>
+        </a:graphic>
+      </p:graphicFrame>
     </p:spTree>
     <p:extLst>
       <p:ext uri="{BB962C8B-B14F-4D97-AF65-F5344CB8AC3E}">
@@ -16394,6 +17268,20 @@
           <a:p>
             <a:r>
               <a:rPr lang="en-US" dirty="0" smtClean="0"/>
+              <a:t>User-defined </a:t>
+            </a:r>
+            <a:r>
+              <a:rPr lang="en-US" i="1" dirty="0" smtClean="0"/>
+              <a:t>executable</a:t>
+            </a:r>
+            <a:r>
+              <a:rPr lang="en-US" dirty="0" smtClean="0"/>
+              <a:t> run-time checks</a:t>
+            </a:r>
+          </a:p>
+          <a:p>
+            <a:r>
+              <a:rPr lang="en-US" dirty="0" smtClean="0"/>
               <a:t>“Preconditions” specify caller obligations</a:t>
             </a:r>
           </a:p>
@@ -16454,8 +17342,8 @@
         </p:nvSpPr>
         <p:spPr>
           <a:xfrm>
-            <a:off x="609600" y="3116240"/>
-            <a:ext cx="1505540" cy="369332"/>
+            <a:off x="762000" y="3573440"/>
+            <a:ext cx="1223412" cy="369332"/>
           </a:xfrm>
           <a:prstGeom prst="rect">
             <a:avLst/>
@@ -16483,7 +17371,7 @@
           <a:lstStyle/>
           <a:p>
             <a:r>
-              <a:rPr lang="en-US" dirty="0">
+              <a:rPr lang="en-US" dirty="0" smtClean="0">
                 <a:solidFill>
                   <a:schemeClr val="bg1"/>
                 </a:solidFill>
@@ -16495,8 +17383,20 @@
                   </a:outerShdw>
                 </a:effectLst>
               </a:rPr>
-              <a:t>Requirement</a:t>
-            </a:r>
+              <a:t>Obligation</a:t>
+            </a:r>
+            <a:endParaRPr lang="en-US" dirty="0">
+              <a:solidFill>
+                <a:schemeClr val="bg1"/>
+              </a:solidFill>
+              <a:effectLst>
+                <a:outerShdw blurRad="38100" dist="38100" dir="2700000" algn="tl">
+                  <a:srgbClr val="000000">
+                    <a:alpha val="43137"/>
+                  </a:srgbClr>
+                </a:outerShdw>
+              </a:effectLst>
+            </a:endParaRPr>
           </a:p>
         </p:txBody>
       </p:sp>
@@ -16511,8 +17411,8 @@
         </p:nvCxnSpPr>
         <p:spPr bwMode="auto">
           <a:xfrm>
-            <a:off x="2115140" y="3300906"/>
-            <a:ext cx="467148" cy="162679"/>
+            <a:off x="1985412" y="3758106"/>
+            <a:ext cx="596876" cy="162679"/>
           </a:xfrm>
           <a:prstGeom prst="curvedConnector3">
             <a:avLst>
@@ -16542,7 +17442,7 @@
         </p:nvSpPr>
         <p:spPr bwMode="auto">
           <a:xfrm>
-            <a:off x="2582288" y="3394570"/>
+            <a:off x="2582288" y="3851770"/>
             <a:ext cx="127000" cy="138030"/>
           </a:xfrm>
           <a:prstGeom prst="rect">
@@ -16597,7 +17497,7 @@
         </p:nvSpPr>
         <p:spPr>
           <a:xfrm>
-            <a:off x="725016" y="3726096"/>
+            <a:off x="725016" y="4183296"/>
             <a:ext cx="1274708" cy="369332"/>
           </a:xfrm>
           <a:prstGeom prst="rect">
@@ -16654,7 +17554,7 @@
         </p:nvCxnSpPr>
         <p:spPr bwMode="auto">
           <a:xfrm flipV="1">
-            <a:off x="1999724" y="3670238"/>
+            <a:off x="1999724" y="4127438"/>
             <a:ext cx="582564" cy="240524"/>
           </a:xfrm>
           <a:prstGeom prst="curvedConnector3">
@@ -16685,7 +17585,7 @@
         </p:nvSpPr>
         <p:spPr bwMode="auto">
           <a:xfrm>
-            <a:off x="2582288" y="3601223"/>
+            <a:off x="2582288" y="4058423"/>
             <a:ext cx="127000" cy="138030"/>
           </a:xfrm>
           <a:prstGeom prst="rect">
@@ -16740,7 +17640,7 @@
         </p:nvSpPr>
         <p:spPr>
           <a:xfrm>
-            <a:off x="2514600" y="2933700"/>
+            <a:off x="2514600" y="3390900"/>
             <a:ext cx="5603906" cy="2074927"/>
           </a:xfrm>
           <a:prstGeom prst="rect">
@@ -17050,8 +17950,8 @@
         </p:nvSpPr>
         <p:spPr>
           <a:xfrm>
-            <a:off x="838200" y="1009114"/>
-            <a:ext cx="7932556" cy="4493538"/>
+            <a:off x="555407" y="876300"/>
+            <a:ext cx="7956986" cy="4190891"/>
           </a:xfrm>
           <a:prstGeom prst="rect">
             <a:avLst/>
@@ -17095,7 +17995,7 @@
           <a:p>
             <a:pPr>
               <a:spcBef>
-                <a:spcPts val="167"/>
+                <a:spcPts val="300"/>
               </a:spcBef>
               <a:tabLst>
                 <a:tab pos="238115" algn="l"/>
@@ -17107,7 +18007,7 @@
                 <a:latin typeface="Calibri" panose="020F0502020204030204" pitchFamily="34" charset="0"/>
                 <a:cs typeface="Consolas" panose="020B0609020204030204" pitchFamily="49" charset="0"/>
               </a:rPr>
-              <a:t>	(FIFO_Error_Indicated,</a:t>
+              <a:t>	(FIFO_Error,</a:t>
             </a:r>
           </a:p>
           <a:p>
@@ -17125,7 +18025,7 @@
                 <a:latin typeface="Calibri" panose="020F0502020204030204" pitchFamily="34" charset="0"/>
                 <a:cs typeface="Consolas" panose="020B0609020204030204" pitchFamily="49" charset="0"/>
               </a:rPr>
-              <a:t>		Direct_Mode_Error_Indicated,</a:t>
+              <a:t>		Direct_Mode_Error,</a:t>
             </a:r>
           </a:p>
           <a:p>
@@ -17143,7 +18043,7 @@
                 <a:latin typeface="Calibri" panose="020F0502020204030204" pitchFamily="34" charset="0"/>
                 <a:cs typeface="Consolas" panose="020B0609020204030204" pitchFamily="49" charset="0"/>
               </a:rPr>
-              <a:t>		Transfer_Error_Indicated,</a:t>
+              <a:t>		Transfer_Error,</a:t>
             </a:r>
           </a:p>
           <a:p>
@@ -17161,7 +18061,7 @@
                 <a:latin typeface="Calibri" panose="020F0502020204030204" pitchFamily="34" charset="0"/>
                 <a:cs typeface="Consolas" panose="020B0609020204030204" pitchFamily="49" charset="0"/>
               </a:rPr>
-              <a:t>		Half_Transfer_Complete_Indicated,</a:t>
+              <a:t>		Half_Transfer_Complete,</a:t>
             </a:r>
           </a:p>
           <a:p>
@@ -17179,25 +18079,13 @@
                 <a:latin typeface="Calibri" panose="020F0502020204030204" pitchFamily="34" charset="0"/>
                 <a:cs typeface="Consolas" panose="020B0609020204030204" pitchFamily="49" charset="0"/>
               </a:rPr>
-              <a:t>		Transfer_Complete_Indicated);</a:t>
-            </a:r>
-          </a:p>
-          <a:p>
-            <a:pPr>
-              <a:tabLst>
-                <a:tab pos="238115" algn="l"/>
-                <a:tab pos="287062" algn="l"/>
-              </a:tabLst>
-            </a:pPr>
-            <a:endParaRPr lang="en-US" sz="1600" noProof="1" smtClean="0">
-              <a:latin typeface="Calibri" panose="020F0502020204030204" pitchFamily="34" charset="0"/>
-              <a:cs typeface="Consolas" panose="020B0609020204030204" pitchFamily="49" charset="0"/>
-            </a:endParaRPr>
+              <a:t>		Transfer_Complete);</a:t>
+            </a:r>
           </a:p>
           <a:p>
             <a:pPr>
               <a:spcBef>
-                <a:spcPts val="1000"/>
+                <a:spcPts val="2400"/>
               </a:spcBef>
               <a:tabLst>
                 <a:tab pos="238115" algn="l"/>
@@ -17206,6 +18094,88 @@
               </a:tabLst>
             </a:pPr>
             <a:r>
+              <a:rPr lang="en-US" sz="1600" b="1" noProof="1">
+                <a:latin typeface="Calibri" panose="020F0502020204030204" pitchFamily="34" charset="0"/>
+                <a:cs typeface="Consolas" panose="020B0609020204030204" pitchFamily="49" charset="0"/>
+              </a:rPr>
+              <a:t>function </a:t>
+            </a:r>
+            <a:r>
+              <a:rPr lang="en-US" sz="1600" noProof="1">
+                <a:latin typeface="Calibri" panose="020F0502020204030204" pitchFamily="34" charset="0"/>
+                <a:cs typeface="Consolas" panose="020B0609020204030204" pitchFamily="49" charset="0"/>
+              </a:rPr>
+              <a:t>Status_Indicated </a:t>
+            </a:r>
+            <a:endParaRPr lang="en-US" sz="1600" noProof="1" smtClean="0">
+              <a:latin typeface="Calibri" panose="020F0502020204030204" pitchFamily="34" charset="0"/>
+              <a:cs typeface="Consolas" panose="020B0609020204030204" pitchFamily="49" charset="0"/>
+            </a:endParaRPr>
+          </a:p>
+          <a:p>
+            <a:pPr>
+              <a:spcBef>
+                <a:spcPts val="300"/>
+              </a:spcBef>
+              <a:tabLst>
+                <a:tab pos="238115" algn="l"/>
+                <a:tab pos="523854" algn="l"/>
+                <a:tab pos="574123" algn="l"/>
+              </a:tabLst>
+            </a:pPr>
+            <a:r>
+              <a:rPr lang="en-US" sz="1600" noProof="1" smtClean="0">
+                <a:latin typeface="Calibri" panose="020F0502020204030204" pitchFamily="34" charset="0"/>
+                <a:cs typeface="Consolas" panose="020B0609020204030204" pitchFamily="49" charset="0"/>
+              </a:rPr>
+              <a:t>	(Unit : DMA_Controller;  Stream : DMA_Stream_Selector;  Flag : DMA_Status_Flag)</a:t>
+            </a:r>
+          </a:p>
+          <a:p>
+            <a:pPr>
+              <a:spcBef>
+                <a:spcPts val="300"/>
+              </a:spcBef>
+              <a:tabLst>
+                <a:tab pos="238115" algn="l"/>
+                <a:tab pos="523854" algn="l"/>
+                <a:tab pos="574123" algn="l"/>
+              </a:tabLst>
+            </a:pPr>
+            <a:r>
+              <a:rPr lang="en-US" sz="1600" b="1" noProof="1">
+                <a:latin typeface="Calibri" panose="020F0502020204030204" pitchFamily="34" charset="0"/>
+                <a:cs typeface="Consolas" panose="020B0609020204030204" pitchFamily="49" charset="0"/>
+              </a:rPr>
+              <a:t>	return </a:t>
+            </a:r>
+            <a:r>
+              <a:rPr lang="en-US" sz="1600" noProof="1">
+                <a:latin typeface="Calibri" panose="020F0502020204030204" pitchFamily="34" charset="0"/>
+                <a:cs typeface="Consolas" panose="020B0609020204030204" pitchFamily="49" charset="0"/>
+              </a:rPr>
+              <a:t>Boolean</a:t>
+            </a:r>
+            <a:r>
+              <a:rPr lang="en-US" sz="1600" noProof="1" smtClean="0">
+                <a:latin typeface="Calibri" panose="020F0502020204030204" pitchFamily="34" charset="0"/>
+                <a:cs typeface="Consolas" panose="020B0609020204030204" pitchFamily="49" charset="0"/>
+              </a:rPr>
+              <a:t>;</a:t>
+            </a:r>
+          </a:p>
+          <a:p>
+            <a:pPr>
+              <a:spcBef>
+                <a:spcPts val="2400"/>
+              </a:spcBef>
+              <a:tabLst>
+                <a:tab pos="238115" algn="l"/>
+                <a:tab pos="523854" algn="l"/>
+                <a:tab pos="574123" algn="l"/>
+              </a:tabLst>
+            </a:pPr>
+            <a:r>
               <a:rPr lang="en-US" sz="1600" b="1" noProof="1" smtClean="0">
                 <a:latin typeface="Calibri" panose="020F0502020204030204" pitchFamily="34" charset="0"/>
                 <a:cs typeface="Consolas" panose="020B0609020204030204" pitchFamily="49" charset="0"/>
@@ -17217,7 +18187,27 @@
                 <a:latin typeface="Calibri" panose="020F0502020204030204" pitchFamily="34" charset="0"/>
                 <a:cs typeface="Consolas" panose="020B0609020204030204" pitchFamily="49" charset="0"/>
               </a:rPr>
-              <a:t>Clear_All_Status (Unit : </a:t>
+              <a:t>Clear_All_Status (</a:t>
+            </a:r>
+            <a:r>
+              <a:rPr lang="en-US" sz="1600" b="1" noProof="1" smtClean="0">
+                <a:solidFill>
+                  <a:schemeClr val="tx2">
+                    <a:lumMod val="75000"/>
+                    <a:lumOff val="25000"/>
+                  </a:schemeClr>
+                </a:solidFill>
+                <a:latin typeface="Calibri" panose="020F0502020204030204" pitchFamily="34" charset="0"/>
+                <a:cs typeface="Consolas" panose="020B0609020204030204" pitchFamily="49" charset="0"/>
+              </a:rPr>
+              <a:t>Unit</a:t>
+            </a:r>
+            <a:r>
+              <a:rPr lang="en-US" sz="1600" noProof="1" smtClean="0">
+                <a:latin typeface="Calibri" panose="020F0502020204030204" pitchFamily="34" charset="0"/>
+                <a:cs typeface="Consolas" panose="020B0609020204030204" pitchFamily="49" charset="0"/>
+              </a:rPr>
+              <a:t> : </a:t>
             </a:r>
             <a:r>
               <a:rPr lang="en-US" sz="1600" b="1" noProof="1" smtClean="0">
@@ -17231,7 +18221,27 @@
                 <a:latin typeface="Calibri" panose="020F0502020204030204" pitchFamily="34" charset="0"/>
                 <a:cs typeface="Consolas" panose="020B0609020204030204" pitchFamily="49" charset="0"/>
               </a:rPr>
-              <a:t>DMA_Controller;    Stream : DMA_Stream_Selector)</a:t>
+              <a:t>DMA_Controller;    </a:t>
+            </a:r>
+            <a:r>
+              <a:rPr lang="en-US" sz="1600" b="1" noProof="1">
+                <a:solidFill>
+                  <a:schemeClr val="tx2">
+                    <a:lumMod val="75000"/>
+                    <a:lumOff val="25000"/>
+                  </a:schemeClr>
+                </a:solidFill>
+                <a:latin typeface="Calibri" panose="020F0502020204030204" pitchFamily="34" charset="0"/>
+                <a:cs typeface="Consolas" panose="020B0609020204030204" pitchFamily="49" charset="0"/>
+              </a:rPr>
+              <a:t>Stream</a:t>
+            </a:r>
+            <a:r>
+              <a:rPr lang="en-US" sz="1600" noProof="1" smtClean="0">
+                <a:latin typeface="Calibri" panose="020F0502020204030204" pitchFamily="34" charset="0"/>
+                <a:cs typeface="Consolas" panose="020B0609020204030204" pitchFamily="49" charset="0"/>
+              </a:rPr>
+              <a:t> : DMA_Stream_Selector)</a:t>
             </a:r>
           </a:p>
           <a:p>
@@ -17288,11 +18298,24 @@
               <a:t>for all </a:t>
             </a:r>
             <a:r>
+              <a:rPr lang="en-US" sz="1600" b="1" noProof="1">
+                <a:solidFill>
+                  <a:schemeClr val="tx2">
+                    <a:lumMod val="75000"/>
+                    <a:lumOff val="25000"/>
+                  </a:schemeClr>
+                </a:solidFill>
+                <a:latin typeface="Calibri" panose="020F0502020204030204" pitchFamily="34" charset="0"/>
+                <a:cs typeface="Consolas" panose="020B0609020204030204" pitchFamily="49" charset="0"/>
+              </a:rPr>
+              <a:t>Flag</a:t>
+            </a:r>
+            <a:r>
               <a:rPr lang="en-US" sz="1600" noProof="1" smtClean="0">
                 <a:latin typeface="Calibri" panose="020F0502020204030204" pitchFamily="34" charset="0"/>
                 <a:cs typeface="Consolas" panose="020B0609020204030204" pitchFamily="49" charset="0"/>
               </a:rPr>
-              <a:t>Flag </a:t>
+              <a:t> </a:t>
             </a:r>
             <a:r>
               <a:rPr lang="en-US" sz="1600" b="1" noProof="1" smtClean="0">
@@ -17320,7 +18343,67 @@
                 <a:latin typeface="Calibri" panose="020F0502020204030204" pitchFamily="34" charset="0"/>
                 <a:cs typeface="Consolas" panose="020B0609020204030204" pitchFamily="49" charset="0"/>
               </a:rPr>
-              <a:t>Status_Indicated (Unit, Stream, Flag));</a:t>
+              <a:t>Status_Indicated (</a:t>
+            </a:r>
+            <a:r>
+              <a:rPr lang="en-US" sz="1600" b="1" noProof="1">
+                <a:solidFill>
+                  <a:schemeClr val="tx2">
+                    <a:lumMod val="75000"/>
+                    <a:lumOff val="25000"/>
+                  </a:schemeClr>
+                </a:solidFill>
+                <a:latin typeface="Calibri" panose="020F0502020204030204" pitchFamily="34" charset="0"/>
+                <a:cs typeface="Consolas" panose="020B0609020204030204" pitchFamily="49" charset="0"/>
+              </a:rPr>
+              <a:t>Unit</a:t>
+            </a:r>
+            <a:r>
+              <a:rPr lang="en-US" sz="1600" noProof="1" smtClean="0">
+                <a:latin typeface="Calibri" panose="020F0502020204030204" pitchFamily="34" charset="0"/>
+                <a:cs typeface="Consolas" panose="020B0609020204030204" pitchFamily="49" charset="0"/>
+              </a:rPr>
+              <a:t>, </a:t>
+            </a:r>
+            <a:r>
+              <a:rPr lang="en-US" sz="1600" b="1" noProof="1">
+                <a:solidFill>
+                  <a:schemeClr val="tx2">
+                    <a:lumMod val="75000"/>
+                    <a:lumOff val="25000"/>
+                  </a:schemeClr>
+                </a:solidFill>
+                <a:latin typeface="Calibri" panose="020F0502020204030204" pitchFamily="34" charset="0"/>
+                <a:cs typeface="Consolas" panose="020B0609020204030204" pitchFamily="49" charset="0"/>
+              </a:rPr>
+              <a:t>Stream</a:t>
+            </a:r>
+            <a:r>
+              <a:rPr lang="en-US" sz="1600" noProof="1" smtClean="0">
+                <a:latin typeface="Calibri" panose="020F0502020204030204" pitchFamily="34" charset="0"/>
+                <a:cs typeface="Consolas" panose="020B0609020204030204" pitchFamily="49" charset="0"/>
+              </a:rPr>
+              <a:t>, </a:t>
+            </a:r>
+            <a:r>
+              <a:rPr lang="en-US" sz="1600" b="1" noProof="1">
+                <a:solidFill>
+                  <a:schemeClr val="tx2">
+                    <a:lumMod val="75000"/>
+                    <a:lumOff val="25000"/>
+                  </a:schemeClr>
+                </a:solidFill>
+                <a:latin typeface="Calibri" panose="020F0502020204030204" pitchFamily="34" charset="0"/>
+                <a:cs typeface="Consolas" panose="020B0609020204030204" pitchFamily="49" charset="0"/>
+              </a:rPr>
+              <a:t>Flag</a:t>
+            </a:r>
+            <a:r>
+              <a:rPr lang="en-US" sz="1600" noProof="1" smtClean="0">
+                <a:latin typeface="Calibri" panose="020F0502020204030204" pitchFamily="34" charset="0"/>
+                <a:cs typeface="Consolas" panose="020B0609020204030204" pitchFamily="49" charset="0"/>
+              </a:rPr>
+              <a:t>));</a:t>
             </a:r>
           </a:p>
           <a:p>
@@ -17336,113 +18419,6 @@
               <a:cs typeface="Consolas" panose="020B0609020204030204" pitchFamily="49" charset="0"/>
             </a:endParaRPr>
           </a:p>
-          <a:p>
-            <a:pPr>
-              <a:spcBef>
-                <a:spcPts val="1000"/>
-              </a:spcBef>
-              <a:tabLst>
-                <a:tab pos="238115" algn="l"/>
-                <a:tab pos="523854" algn="l"/>
-                <a:tab pos="574123" algn="l"/>
-              </a:tabLst>
-            </a:pPr>
-            <a:r>
-              <a:rPr lang="en-US" sz="1600" b="1" noProof="1" smtClean="0">
-                <a:latin typeface="Calibri" panose="020F0502020204030204" pitchFamily="34" charset="0"/>
-                <a:cs typeface="Consolas" panose="020B0609020204030204" pitchFamily="49" charset="0"/>
-              </a:rPr>
-              <a:t>function </a:t>
-            </a:r>
-            <a:r>
-              <a:rPr lang="en-US" sz="1600" noProof="1" smtClean="0">
-                <a:latin typeface="Calibri" panose="020F0502020204030204" pitchFamily="34" charset="0"/>
-                <a:cs typeface="Consolas" panose="020B0609020204030204" pitchFamily="49" charset="0"/>
-              </a:rPr>
-              <a:t>Status_Indicated</a:t>
-            </a:r>
-          </a:p>
-          <a:p>
-            <a:pPr>
-              <a:tabLst>
-                <a:tab pos="236538" algn="l"/>
-                <a:tab pos="285750" algn="l"/>
-                <a:tab pos="573088" algn="l"/>
-                <a:tab pos="809625" algn="l"/>
-                <a:tab pos="914400" algn="l"/>
-              </a:tabLst>
-            </a:pPr>
-            <a:r>
-              <a:rPr lang="en-US" sz="1600" noProof="1" smtClean="0">
-                <a:latin typeface="Calibri" panose="020F0502020204030204" pitchFamily="34" charset="0"/>
-                <a:cs typeface="Consolas" panose="020B0609020204030204" pitchFamily="49" charset="0"/>
-              </a:rPr>
-              <a:t>	(Unit		: DMA_Controller;</a:t>
-            </a:r>
-          </a:p>
-          <a:p>
-            <a:pPr>
-              <a:tabLst>
-                <a:tab pos="236538" algn="l"/>
-                <a:tab pos="285750" algn="l"/>
-                <a:tab pos="573088" algn="l"/>
-                <a:tab pos="809625" algn="l"/>
-                <a:tab pos="914400" algn="l"/>
-              </a:tabLst>
-            </a:pPr>
-            <a:r>
-              <a:rPr lang="en-US" sz="1600" noProof="1" smtClean="0">
-                <a:latin typeface="Calibri" panose="020F0502020204030204" pitchFamily="34" charset="0"/>
-                <a:cs typeface="Consolas" panose="020B0609020204030204" pitchFamily="49" charset="0"/>
-              </a:rPr>
-              <a:t>		Stream	: DMA_Stream_Selector;</a:t>
-            </a:r>
-          </a:p>
-          <a:p>
-            <a:pPr>
-              <a:tabLst>
-                <a:tab pos="236538" algn="l"/>
-                <a:tab pos="285750" algn="l"/>
-                <a:tab pos="573088" algn="l"/>
-                <a:tab pos="809625" algn="l"/>
-                <a:tab pos="914400" algn="l"/>
-              </a:tabLst>
-            </a:pPr>
-            <a:r>
-              <a:rPr lang="en-US" sz="1600" noProof="1" smtClean="0">
-                <a:latin typeface="Calibri" panose="020F0502020204030204" pitchFamily="34" charset="0"/>
-                <a:cs typeface="Consolas" panose="020B0609020204030204" pitchFamily="49" charset="0"/>
-              </a:rPr>
-              <a:t>		Flag		: DMA_Status_Flag)</a:t>
-            </a:r>
-          </a:p>
-          <a:p>
-            <a:pPr>
-              <a:tabLst>
-                <a:tab pos="238115" algn="l"/>
-                <a:tab pos="523854" algn="l"/>
-                <a:tab pos="574123" algn="l"/>
-              </a:tabLst>
-            </a:pPr>
-            <a:r>
-              <a:rPr lang="en-US" sz="1600" b="1" noProof="1" smtClean="0">
-                <a:latin typeface="Calibri" panose="020F0502020204030204" pitchFamily="34" charset="0"/>
-                <a:cs typeface="Consolas" panose="020B0609020204030204" pitchFamily="49" charset="0"/>
-              </a:rPr>
-              <a:t>	return </a:t>
-            </a:r>
-            <a:r>
-              <a:rPr lang="en-US" sz="1600" noProof="1" smtClean="0">
-                <a:latin typeface="Calibri" panose="020F0502020204030204" pitchFamily="34" charset="0"/>
-                <a:cs typeface="Consolas" panose="020B0609020204030204" pitchFamily="49" charset="0"/>
-              </a:rPr>
-              <a:t>Boolean;</a:t>
-            </a:r>
-            <a:endParaRPr lang="en-US" sz="1600" noProof="1">
-              <a:latin typeface="Calibri" panose="020F0502020204030204" pitchFamily="34" charset="0"/>
-              <a:cs typeface="Consolas" panose="020B0609020204030204" pitchFamily="49" charset="0"/>
-            </a:endParaRPr>
-          </a:p>
         </p:txBody>
       </p:sp>
       <p:sp>
@@ -17453,8 +18429,8 @@
         </p:nvSpPr>
         <p:spPr>
           <a:xfrm>
-            <a:off x="5962892" y="4610100"/>
-            <a:ext cx="1827190" cy="830997"/>
+            <a:off x="2057400" y="4955390"/>
+            <a:ext cx="3980082" cy="338554"/>
           </a:xfrm>
           <a:prstGeom prst="rect">
             <a:avLst/>
@@ -17489,82 +18465,6 @@
           </a:p>
         </p:txBody>
       </p:sp>
-      <p:sp>
-        <p:nvSpPr>
-          <p:cNvPr id="7" name="Rectangle 6"/>
-          <p:cNvSpPr/>
-          <p:nvPr/>
-        </p:nvSpPr>
-        <p:spPr bwMode="auto">
-          <a:xfrm>
-            <a:off x="5867400" y="3848100"/>
-            <a:ext cx="127000" cy="118234"/>
-          </a:xfrm>
-          <a:prstGeom prst="rect">
-            <a:avLst/>
-          </a:prstGeom>
-          <a:noFill/>
-          <a:ln w="9525" cap="flat" cmpd="sng" algn="ctr">
-            <a:noFill/>
-            <a:prstDash val="solid"/>
-            <a:round/>
-            <a:headEnd type="none" w="med" len="med"/>
-            <a:tailEnd type="none"/>
-          </a:ln>
-          <a:effectLst/>
-          <a:extLst>
-            <a:ext uri="{909E8E84-426E-40DD-AFC4-6F175D3DCCD1}">
-              <a14:hiddenFill xmlns:a14="http://schemas.microsoft.com/office/drawing/2010/main">
-                <a:solidFill>
-                  <a:schemeClr val="accent2"/>
-                </a:solidFill>
-              </a14:hiddenFill>
-            </a:ext>
-          </a:extLst>
-        </p:spPr>
-        <p:txBody>
-          <a:bodyPr rtlCol="0" anchor="ctr"/>
-          <a:lstStyle/>
-          <a:p>
-            <a:pPr algn="ctr"/>
-            <a:endParaRPr lang="en-US" sz="1500"/>
-          </a:p>
-        </p:txBody>
-      </p:sp>
-      <p:cxnSp>
-        <p:nvCxnSpPr>
-          <p:cNvPr id="8" name="Curved Connector 7"/>
-          <p:cNvCxnSpPr>
-            <a:stCxn id="6" idx="0"/>
-            <a:endCxn id="7" idx="2"/>
-          </p:cNvCxnSpPr>
-          <p:nvPr/>
-        </p:nvCxnSpPr>
-        <p:spPr bwMode="auto">
-          <a:xfrm rot="16200000" flipV="1">
-            <a:off x="6081811" y="3815423"/>
-            <a:ext cx="643766" cy="945587"/>
-          </a:xfrm>
-          <a:prstGeom prst="curvedConnector3">
-            <a:avLst>
-              <a:gd name="adj1" fmla="val 50000"/>
-            </a:avLst>
-          </a:prstGeom>
-          <a:solidFill>
-            <a:schemeClr val="accent1"/>
-          </a:solidFill>
-          <a:ln w="9525" cap="flat" cmpd="sng" algn="ctr">
-            <a:solidFill>
-              <a:schemeClr val="tx1"/>
-            </a:solidFill>
-            <a:prstDash val="solid"/>
-            <a:round/>
-            <a:headEnd type="none" w="med" len="med"/>
-            <a:tailEnd type="stealth"/>
-          </a:ln>
-          <a:effectLst/>
-        </p:spPr>
-      </p:cxnSp>
     </p:spTree>
     <p:extLst>
       <p:ext uri="{BB962C8B-B14F-4D97-AF65-F5344CB8AC3E}">
@@ -17623,12 +18523,25 @@
         </p:spPr>
         <p:txBody>
           <a:bodyPr>
-            <a:normAutofit lnSpcReduction="10000"/>
+            <a:normAutofit/>
           </a:bodyPr>
           <a:lstStyle/>
           <a:p>
             <a:r>
               <a:rPr lang="en-US" dirty="0" smtClean="0"/>
+              <a:t>Freedom from run-time errors</a:t>
+            </a:r>
+          </a:p>
+          <a:p>
+            <a:pPr lvl="1"/>
+            <a:r>
+              <a:rPr lang="en-US" dirty="0" smtClean="0"/>
+              <a:t>No buffer overflow, no numeric overflow, no divide by zero, no invalid array indexes, etc.</a:t>
+            </a:r>
+          </a:p>
+          <a:p>
+            <a:r>
+              <a:rPr lang="en-US" dirty="0" smtClean="0"/>
               <a:t>Data and Information flow</a:t>
             </a:r>
           </a:p>
@@ -17644,19 +18557,6 @@
             <a:r>
               <a:rPr lang="en-US" dirty="0" smtClean="0"/>
               <a:t>Data only goes where you want it to go</a:t>
-            </a:r>
-          </a:p>
-          <a:p>
-            <a:r>
-              <a:rPr lang="en-US" dirty="0" smtClean="0"/>
-              <a:t>Freedom from run-time errors</a:t>
-            </a:r>
-          </a:p>
-          <a:p>
-            <a:pPr lvl="1"/>
-            <a:r>
-              <a:rPr lang="en-US" dirty="0" smtClean="0"/>
-              <a:t>No buffer overflow, no numeric overflow, no divide by zero, no invalid array indexes, no null pointer deference, etc.</a:t>
             </a:r>
           </a:p>
           <a:p>
@@ -17693,7 +18593,7 @@
           <a:p>
             <a:r>
               <a:rPr lang="en-US" dirty="0" smtClean="0"/>
-              <a:t>What Can You Prove With It?</a:t>
+              <a:t>What Can You Prove, Statically?</a:t>
             </a:r>
             <a:endParaRPr lang="en-US" dirty="0"/>
           </a:p>

</xml_diff>